<commit_message>
Added architecture & training section
</commit_message>
<xml_diff>
--- a/DQN/dqn_slides.pptx
+++ b/DQN/dqn_slides.pptx
@@ -5,7 +5,7 @@
     <p:sldMasterId id="2147483648" r:id="rId1"/>
   </p:sldMasterIdLst>
   <p:notesMasterIdLst>
-    <p:notesMasterId r:id="rId9"/>
+    <p:notesMasterId r:id="rId11"/>
   </p:notesMasterIdLst>
   <p:sldIdLst>
     <p:sldId id="256" r:id="rId2"/>
@@ -15,6 +15,8 @@
     <p:sldId id="276" r:id="rId6"/>
     <p:sldId id="277" r:id="rId7"/>
     <p:sldId id="278" r:id="rId8"/>
+    <p:sldId id="279" r:id="rId9"/>
+    <p:sldId id="280" r:id="rId10"/>
   </p:sldIdLst>
   <p:sldSz cx="12192000" cy="6858000"/>
   <p:notesSz cx="6858000" cy="9144000"/>
@@ -203,7 +205,7 @@
           <a:p>
             <a:fld id="{90B6B2DE-9C7A-410D-BB33-96FD23F82A93}" type="datetimeFigureOut">
               <a:rPr lang="en-GB" smtClean="0"/>
-              <a:t>11/03/2020</a:t>
+              <a:t>20/03/2020</a:t>
             </a:fld>
             <a:endParaRPr lang="en-GB"/>
           </a:p>
@@ -626,25 +628,25 @@
           <a:lstStyle/>
           <a:p>
             <a:r>
-              <a:rPr lang="en-GB" dirty="0" smtClean="0"/>
+              <a:rPr lang="en-GB" dirty="0"/>
               <a:t>Because it is impossible to fully</a:t>
             </a:r>
             <a:r>
-              <a:rPr lang="en-GB" baseline="0" dirty="0" smtClean="0"/>
+              <a:rPr lang="en-GB" baseline="0" dirty="0"/>
               <a:t> </a:t>
             </a:r>
             <a:r>
-              <a:rPr lang="en-GB" dirty="0" smtClean="0"/>
+              <a:rPr lang="en-GB" dirty="0"/>
               <a:t>understand</a:t>
             </a:r>
             <a:r>
-              <a:rPr lang="en-GB" baseline="0" dirty="0" smtClean="0"/>
+              <a:rPr lang="en-GB" baseline="0" dirty="0"/>
               <a:t> current situation from only the current screen. </a:t>
             </a:r>
           </a:p>
           <a:p>
             <a:r>
-              <a:rPr lang="en-GB" baseline="0" dirty="0" smtClean="0"/>
+              <a:rPr lang="en-GB" baseline="0" dirty="0"/>
               <a:t>(Not sure of direction or speed …etc.)</a:t>
             </a:r>
             <a:endParaRPr lang="en-GB" dirty="0"/>
@@ -747,32 +749,40 @@
           <a:p>
             <a:r>
               <a:rPr lang="en-GB" dirty="0"/>
-              <a:t>Bellman Equation</a:t>
-            </a:r>
-          </a:p>
-          <a:p>
-            <a:r>
-              <a:rPr lang="en-GB" dirty="0" smtClean="0"/>
+              <a:t>Richard Bellman - Bellman Equation – foundation of dynamic programming</a:t>
+            </a:r>
+          </a:p>
+          <a:p>
+            <a:r>
+              <a:rPr lang="en-GB" dirty="0"/>
               <a:t>Q-Learning</a:t>
             </a:r>
           </a:p>
           <a:p>
-            <a:endParaRPr lang="en-GB" dirty="0" smtClean="0"/>
-          </a:p>
-          <a:p>
-            <a:r>
-              <a:rPr lang="en-GB" dirty="0" smtClean="0"/>
+            <a:endParaRPr lang="en-GB" dirty="0"/>
+          </a:p>
+          <a:p>
+            <a:r>
+              <a:rPr lang="en-GB" dirty="0"/>
               <a:t>Replace</a:t>
             </a:r>
             <a:r>
-              <a:rPr lang="en-GB" baseline="0" dirty="0" smtClean="0"/>
+              <a:rPr lang="en-GB" baseline="0" dirty="0"/>
               <a:t> value iteration with non-linear function approximator (NN). </a:t>
             </a:r>
             <a:r>
-              <a:rPr lang="en-GB" dirty="0" smtClean="0"/>
+              <a:rPr lang="en-GB" dirty="0"/>
               <a:t>Theta are parameters (weights) of network</a:t>
             </a:r>
+          </a:p>
+          <a:p>
             <a:endParaRPr lang="en-GB" dirty="0"/>
+          </a:p>
+          <a:p>
+            <a:r>
+              <a:rPr lang="en-GB" dirty="0"/>
+              <a:t>Mention this is model-free RL because we are not using the rest of the model just approximating q-values</a:t>
+            </a:r>
           </a:p>
         </p:txBody>
       </p:sp>
@@ -857,35 +867,44 @@
           <a:lstStyle/>
           <a:p>
             <a:r>
-              <a:rPr lang="en-GB" dirty="0" smtClean="0"/>
+              <a:rPr lang="en-GB" dirty="0"/>
               <a:t>Deep </a:t>
             </a:r>
             <a:r>
-              <a:rPr lang="en-GB" dirty="0" err="1" smtClean="0"/>
+              <a:rPr lang="en-GB" dirty="0" err="1"/>
               <a:t>nn</a:t>
             </a:r>
             <a:r>
-              <a:rPr lang="en-GB" dirty="0" smtClean="0"/>
+              <a:rPr lang="en-GB" dirty="0"/>
               <a:t> can extract features to learn better representations that can be achieved through handcrafting features.</a:t>
             </a:r>
           </a:p>
           <a:p>
             <a:r>
-              <a:rPr lang="en-GB" dirty="0" smtClean="0"/>
+              <a:rPr lang="en-GB" dirty="0"/>
               <a:t>TD-Gammon</a:t>
             </a:r>
             <a:r>
-              <a:rPr lang="en-GB" baseline="0" dirty="0" smtClean="0"/>
+              <a:rPr lang="en-GB" baseline="0" dirty="0"/>
               <a:t> architecture is some inspiration because it used NN to estimate Value function.</a:t>
             </a:r>
           </a:p>
           <a:p>
-            <a:endParaRPr lang="en-GB" baseline="0" dirty="0" smtClean="0"/>
-          </a:p>
-          <a:p>
-            <a:r>
-              <a:rPr lang="en-GB" baseline="0" dirty="0" smtClean="0"/>
+            <a:endParaRPr lang="en-GB" baseline="0" dirty="0"/>
+          </a:p>
+          <a:p>
+            <a:r>
+              <a:rPr lang="en-GB" baseline="0" dirty="0"/>
               <a:t>Authors use Experience Replay</a:t>
+            </a:r>
+          </a:p>
+          <a:p>
+            <a:endParaRPr lang="en-GB" baseline="0" dirty="0"/>
+          </a:p>
+          <a:p>
+            <a:r>
+              <a:rPr lang="en-GB" baseline="0" dirty="0"/>
+              <a:t>Perform Q-learning updates to mini-batches in the inner loop of the algorithm.</a:t>
             </a:r>
             <a:endParaRPr lang="en-GB" dirty="0"/>
           </a:p>
@@ -918,6 +937,271 @@
     <p:extLst>
       <p:ext uri="{BB962C8B-B14F-4D97-AF65-F5344CB8AC3E}">
         <p14:creationId xmlns:p14="http://schemas.microsoft.com/office/powerpoint/2010/main" val="2912321775"/>
+      </p:ext>
+    </p:extLst>
+  </p:cSld>
+  <p:clrMapOvr>
+    <a:masterClrMapping/>
+  </p:clrMapOvr>
+</p:notes>
+</file>
+
+<file path=ppt/notesSlides/notesSlide5.xml><?xml version="1.0" encoding="utf-8"?>
+<p:notes xmlns:a="http://schemas.openxmlformats.org/drawingml/2006/main" xmlns:r="http://schemas.openxmlformats.org/officeDocument/2006/relationships" xmlns:p="http://schemas.openxmlformats.org/presentationml/2006/main">
+  <p:cSld>
+    <p:spTree>
+      <p:nvGrpSpPr>
+        <p:cNvPr id="1" name=""/>
+        <p:cNvGrpSpPr/>
+        <p:nvPr/>
+      </p:nvGrpSpPr>
+      <p:grpSpPr>
+        <a:xfrm>
+          <a:off x="0" y="0"/>
+          <a:ext cx="0" cy="0"/>
+          <a:chOff x="0" y="0"/>
+          <a:chExt cx="0" cy="0"/>
+        </a:xfrm>
+      </p:grpSpPr>
+      <p:sp>
+        <p:nvSpPr>
+          <p:cNvPr id="2" name="Slide Image Placeholder 1"/>
+          <p:cNvSpPr>
+            <a:spLocks noGrp="1" noRot="1" noChangeAspect="1"/>
+          </p:cNvSpPr>
+          <p:nvPr>
+            <p:ph type="sldImg"/>
+          </p:nvPr>
+        </p:nvSpPr>
+        <p:spPr/>
+      </p:sp>
+      <p:sp>
+        <p:nvSpPr>
+          <p:cNvPr id="3" name="Notes Placeholder 2"/>
+          <p:cNvSpPr>
+            <a:spLocks noGrp="1"/>
+          </p:cNvSpPr>
+          <p:nvPr>
+            <p:ph type="body" idx="1"/>
+          </p:nvPr>
+        </p:nvSpPr>
+        <p:spPr/>
+        <p:txBody>
+          <a:bodyPr/>
+          <a:lstStyle/>
+          <a:p>
+            <a:r>
+              <a:rPr lang="en-GB" dirty="0"/>
+              <a:t>Final cropping step only needed because authors use GPU implementation that requires square inputs.</a:t>
+            </a:r>
+          </a:p>
+          <a:p>
+            <a:endParaRPr lang="en-GB" dirty="0"/>
+          </a:p>
+          <a:p>
+            <a:r>
+              <a:rPr lang="en-GB" dirty="0"/>
+              <a:t>Advantage is ability to compute Q-values for all possible actions for a state with only one forward pass through the network.</a:t>
+            </a:r>
+          </a:p>
+        </p:txBody>
+      </p:sp>
+      <p:sp>
+        <p:nvSpPr>
+          <p:cNvPr id="4" name="Slide Number Placeholder 3"/>
+          <p:cNvSpPr>
+            <a:spLocks noGrp="1"/>
+          </p:cNvSpPr>
+          <p:nvPr>
+            <p:ph type="sldNum" sz="quarter" idx="5"/>
+          </p:nvPr>
+        </p:nvSpPr>
+        <p:spPr/>
+        <p:txBody>
+          <a:bodyPr/>
+          <a:lstStyle/>
+          <a:p>
+            <a:fld id="{5EB41D8C-D68C-4D87-9D56-7F243B38E3DB}" type="slidenum">
+              <a:rPr lang="en-GB" smtClean="0"/>
+              <a:t>7</a:t>
+            </a:fld>
+            <a:endParaRPr lang="en-GB"/>
+          </a:p>
+        </p:txBody>
+      </p:sp>
+    </p:spTree>
+    <p:extLst>
+      <p:ext uri="{BB962C8B-B14F-4D97-AF65-F5344CB8AC3E}">
+        <p14:creationId xmlns:p14="http://schemas.microsoft.com/office/powerpoint/2010/main" val="2037118467"/>
+      </p:ext>
+    </p:extLst>
+  </p:cSld>
+  <p:clrMapOvr>
+    <a:masterClrMapping/>
+  </p:clrMapOvr>
+</p:notes>
+</file>
+
+<file path=ppt/notesSlides/notesSlide6.xml><?xml version="1.0" encoding="utf-8"?>
+<p:notes xmlns:a="http://schemas.openxmlformats.org/drawingml/2006/main" xmlns:r="http://schemas.openxmlformats.org/officeDocument/2006/relationships" xmlns:p="http://schemas.openxmlformats.org/presentationml/2006/main">
+  <p:cSld>
+    <p:spTree>
+      <p:nvGrpSpPr>
+        <p:cNvPr id="1" name=""/>
+        <p:cNvGrpSpPr/>
+        <p:nvPr/>
+      </p:nvGrpSpPr>
+      <p:grpSpPr>
+        <a:xfrm>
+          <a:off x="0" y="0"/>
+          <a:ext cx="0" cy="0"/>
+          <a:chOff x="0" y="0"/>
+          <a:chExt cx="0" cy="0"/>
+        </a:xfrm>
+      </p:grpSpPr>
+      <p:sp>
+        <p:nvSpPr>
+          <p:cNvPr id="2" name="Slide Image Placeholder 1"/>
+          <p:cNvSpPr>
+            <a:spLocks noGrp="1" noRot="1" noChangeAspect="1"/>
+          </p:cNvSpPr>
+          <p:nvPr>
+            <p:ph type="sldImg"/>
+          </p:nvPr>
+        </p:nvSpPr>
+        <p:spPr/>
+      </p:sp>
+      <p:sp>
+        <p:nvSpPr>
+          <p:cNvPr id="3" name="Notes Placeholder 2"/>
+          <p:cNvSpPr>
+            <a:spLocks noGrp="1"/>
+          </p:cNvSpPr>
+          <p:nvPr>
+            <p:ph type="body" idx="1"/>
+          </p:nvPr>
+        </p:nvSpPr>
+        <p:spPr/>
+        <p:txBody>
+          <a:bodyPr/>
+          <a:lstStyle/>
+          <a:p>
+            <a:r>
+              <a:rPr lang="en-GB" dirty="0"/>
+              <a:t>7 Games:  Beam Rider, Breakout, </a:t>
+            </a:r>
+            <a:r>
+              <a:rPr lang="en-GB" dirty="0" err="1"/>
+              <a:t>Enduro</a:t>
+            </a:r>
+            <a:r>
+              <a:rPr lang="en-GB" dirty="0"/>
+              <a:t>, Pong, Q*</a:t>
+            </a:r>
+            <a:r>
+              <a:rPr lang="en-GB" dirty="0" err="1"/>
+              <a:t>bert</a:t>
+            </a:r>
+            <a:r>
+              <a:rPr lang="en-GB" dirty="0"/>
+              <a:t>, </a:t>
+            </a:r>
+            <a:r>
+              <a:rPr lang="en-GB" dirty="0" err="1"/>
+              <a:t>Seaquest</a:t>
+            </a:r>
+            <a:r>
+              <a:rPr lang="en-GB" dirty="0"/>
+              <a:t>, Space Invaders</a:t>
+            </a:r>
+          </a:p>
+          <a:p>
+            <a:endParaRPr lang="en-GB" dirty="0"/>
+          </a:p>
+          <a:p>
+            <a:r>
+              <a:rPr lang="en-GB" dirty="0"/>
+              <a:t>Positive rewards </a:t>
+            </a:r>
+            <a:r>
+              <a:rPr lang="en-GB" dirty="0" err="1"/>
+              <a:t>goto</a:t>
+            </a:r>
+            <a:r>
+              <a:rPr lang="en-GB" dirty="0"/>
+              <a:t> 1, negative rewards </a:t>
+            </a:r>
+            <a:r>
+              <a:rPr lang="en-GB" dirty="0" err="1"/>
+              <a:t>goto</a:t>
+            </a:r>
+            <a:r>
+              <a:rPr lang="en-GB" dirty="0"/>
+              <a:t> -1 &amp; zero rewards remain at zero. </a:t>
+            </a:r>
+          </a:p>
+          <a:p>
+            <a:r>
+              <a:rPr lang="en-GB" dirty="0"/>
+              <a:t>This limits the scale of the error derivatives making it easier to same learning rate hyperparameter across games.</a:t>
+            </a:r>
+          </a:p>
+          <a:p>
+            <a:r>
+              <a:rPr lang="en-GB" dirty="0"/>
+              <a:t>Note: this could limit agent performance since there is no differentiation between rewards of different magnitude.</a:t>
+            </a:r>
+          </a:p>
+          <a:p>
+            <a:endParaRPr lang="en-GB" dirty="0"/>
+          </a:p>
+          <a:p>
+            <a:r>
+              <a:rPr lang="en-GB" dirty="0"/>
+              <a:t>Frame skipping technique, agent sees every kth frame with last action being repeated on frames it doesn’t see.</a:t>
+            </a:r>
+          </a:p>
+          <a:p>
+            <a:r>
+              <a:rPr lang="en-GB" dirty="0"/>
+              <a:t>Easier skip emulator forward than select action for each frame, this allows k times more games to be played.</a:t>
+            </a:r>
+          </a:p>
+          <a:p>
+            <a:r>
+              <a:rPr lang="en-GB" dirty="0"/>
+              <a:t>K=4 for games except for Space Invaders where k=3 (to make the lasers visible to the agent)</a:t>
+            </a:r>
+          </a:p>
+        </p:txBody>
+      </p:sp>
+      <p:sp>
+        <p:nvSpPr>
+          <p:cNvPr id="4" name="Slide Number Placeholder 3"/>
+          <p:cNvSpPr>
+            <a:spLocks noGrp="1"/>
+          </p:cNvSpPr>
+          <p:nvPr>
+            <p:ph type="sldNum" sz="quarter" idx="5"/>
+          </p:nvPr>
+        </p:nvSpPr>
+        <p:spPr/>
+        <p:txBody>
+          <a:bodyPr/>
+          <a:lstStyle/>
+          <a:p>
+            <a:fld id="{5EB41D8C-D68C-4D87-9D56-7F243B38E3DB}" type="slidenum">
+              <a:rPr lang="en-GB" smtClean="0"/>
+              <a:t>8</a:t>
+            </a:fld>
+            <a:endParaRPr lang="en-GB"/>
+          </a:p>
+        </p:txBody>
+      </p:sp>
+    </p:spTree>
+    <p:extLst>
+      <p:ext uri="{BB962C8B-B14F-4D97-AF65-F5344CB8AC3E}">
+        <p14:creationId xmlns:p14="http://schemas.microsoft.com/office/powerpoint/2010/main" val="3453962627"/>
       </p:ext>
     </p:extLst>
   </p:cSld>
@@ -1076,7 +1360,7 @@
           <a:p>
             <a:fld id="{A3ACD417-9FA5-4093-9E64-8EEA39F65FF1}" type="datetimeFigureOut">
               <a:rPr lang="en-GB" smtClean="0"/>
-              <a:t>11/03/2020</a:t>
+              <a:t>20/03/2020</a:t>
             </a:fld>
             <a:endParaRPr lang="en-GB"/>
           </a:p>
@@ -1276,7 +1560,7 @@
           <a:p>
             <a:fld id="{A3ACD417-9FA5-4093-9E64-8EEA39F65FF1}" type="datetimeFigureOut">
               <a:rPr lang="en-GB" smtClean="0"/>
-              <a:t>11/03/2020</a:t>
+              <a:t>20/03/2020</a:t>
             </a:fld>
             <a:endParaRPr lang="en-GB"/>
           </a:p>
@@ -1486,7 +1770,7 @@
           <a:p>
             <a:fld id="{A3ACD417-9FA5-4093-9E64-8EEA39F65FF1}" type="datetimeFigureOut">
               <a:rPr lang="en-GB" smtClean="0"/>
-              <a:t>11/03/2020</a:t>
+              <a:t>20/03/2020</a:t>
             </a:fld>
             <a:endParaRPr lang="en-GB"/>
           </a:p>
@@ -1686,7 +1970,7 @@
           <a:p>
             <a:fld id="{A3ACD417-9FA5-4093-9E64-8EEA39F65FF1}" type="datetimeFigureOut">
               <a:rPr lang="en-GB" smtClean="0"/>
-              <a:t>11/03/2020</a:t>
+              <a:t>20/03/2020</a:t>
             </a:fld>
             <a:endParaRPr lang="en-GB"/>
           </a:p>
@@ -1962,7 +2246,7 @@
           <a:p>
             <a:fld id="{A3ACD417-9FA5-4093-9E64-8EEA39F65FF1}" type="datetimeFigureOut">
               <a:rPr lang="en-GB" smtClean="0"/>
-              <a:t>11/03/2020</a:t>
+              <a:t>20/03/2020</a:t>
             </a:fld>
             <a:endParaRPr lang="en-GB"/>
           </a:p>
@@ -2230,7 +2514,7 @@
           <a:p>
             <a:fld id="{A3ACD417-9FA5-4093-9E64-8EEA39F65FF1}" type="datetimeFigureOut">
               <a:rPr lang="en-GB" smtClean="0"/>
-              <a:t>11/03/2020</a:t>
+              <a:t>20/03/2020</a:t>
             </a:fld>
             <a:endParaRPr lang="en-GB"/>
           </a:p>
@@ -2645,7 +2929,7 @@
           <a:p>
             <a:fld id="{A3ACD417-9FA5-4093-9E64-8EEA39F65FF1}" type="datetimeFigureOut">
               <a:rPr lang="en-GB" smtClean="0"/>
-              <a:t>11/03/2020</a:t>
+              <a:t>20/03/2020</a:t>
             </a:fld>
             <a:endParaRPr lang="en-GB"/>
           </a:p>
@@ -2787,7 +3071,7 @@
           <a:p>
             <a:fld id="{A3ACD417-9FA5-4093-9E64-8EEA39F65FF1}" type="datetimeFigureOut">
               <a:rPr lang="en-GB" smtClean="0"/>
-              <a:t>11/03/2020</a:t>
+              <a:t>20/03/2020</a:t>
             </a:fld>
             <a:endParaRPr lang="en-GB"/>
           </a:p>
@@ -2900,7 +3184,7 @@
           <a:p>
             <a:fld id="{A3ACD417-9FA5-4093-9E64-8EEA39F65FF1}" type="datetimeFigureOut">
               <a:rPr lang="en-GB" smtClean="0"/>
-              <a:t>11/03/2020</a:t>
+              <a:t>20/03/2020</a:t>
             </a:fld>
             <a:endParaRPr lang="en-GB"/>
           </a:p>
@@ -3213,7 +3497,7 @@
           <a:p>
             <a:fld id="{A3ACD417-9FA5-4093-9E64-8EEA39F65FF1}" type="datetimeFigureOut">
               <a:rPr lang="en-GB" smtClean="0"/>
-              <a:t>11/03/2020</a:t>
+              <a:t>20/03/2020</a:t>
             </a:fld>
             <a:endParaRPr lang="en-GB"/>
           </a:p>
@@ -3502,7 +3786,7 @@
           <a:p>
             <a:fld id="{A3ACD417-9FA5-4093-9E64-8EEA39F65FF1}" type="datetimeFigureOut">
               <a:rPr lang="en-GB" smtClean="0"/>
-              <a:t>11/03/2020</a:t>
+              <a:t>20/03/2020</a:t>
             </a:fld>
             <a:endParaRPr lang="en-GB"/>
           </a:p>
@@ -3771,7 +4055,7 @@
           <a:p>
             <a:fld id="{A3ACD417-9FA5-4093-9E64-8EEA39F65FF1}" type="datetimeFigureOut">
               <a:rPr lang="en-GB" smtClean="0"/>
-              <a:t>11/03/2020</a:t>
+              <a:t>20/03/2020</a:t>
             </a:fld>
             <a:endParaRPr lang="en-GB"/>
           </a:p>
@@ -4480,13 +4764,8 @@
             </a:pPr>
             <a:r>
               <a:rPr lang="en-GB" sz="3600" dirty="0"/>
-              <a:t>Atari 2600 </a:t>
-            </a:r>
-            <a:r>
-              <a:rPr lang="en-GB" sz="3600" dirty="0" smtClean="0"/>
-              <a:t>Testbed</a:t>
-            </a:r>
-            <a:endParaRPr lang="en-GB" sz="3600" dirty="0"/>
+              <a:t>Atari 2600 Testbed</a:t>
+            </a:r>
           </a:p>
           <a:p>
             <a:pPr marL="285750" indent="-285750">
@@ -4500,7 +4779,6 @@
               <a:rPr lang="en-GB" sz="3600" dirty="0"/>
               <a:t>Action-Value Function </a:t>
             </a:r>
-            <a:endParaRPr lang="en-GB" sz="3600" dirty="0" smtClean="0"/>
           </a:p>
           <a:p>
             <a:pPr marL="285750" indent="-285750">
@@ -4511,12 +4789,8 @@
               <a:buChar char="•"/>
             </a:pPr>
             <a:r>
-              <a:rPr lang="en-GB" sz="3600" dirty="0" smtClean="0"/>
-              <a:t>Deep </a:t>
-            </a:r>
-            <a:r>
               <a:rPr lang="en-GB" sz="3600" dirty="0"/>
-              <a:t>Reinforcement Learning (DQN)</a:t>
+              <a:t>Deep Reinforcement Learning (DQN)</a:t>
             </a:r>
           </a:p>
           <a:p>
@@ -4580,8 +4854,8 @@
           <a:chExt cx="0" cy="0"/>
         </a:xfrm>
       </p:grpSpPr>
-      <mc:AlternateContent xmlns:mc="http://schemas.openxmlformats.org/markup-compatibility/2006">
-        <mc:Choice xmlns:a14="http://schemas.microsoft.com/office/drawing/2010/main" Requires="a14">
+      <mc:AlternateContent xmlns:mc="http://schemas.openxmlformats.org/markup-compatibility/2006" xmlns:a14="http://schemas.microsoft.com/office/drawing/2010/main">
+        <mc:Choice Requires="a14">
           <p:sp>
             <p:nvSpPr>
               <p:cNvPr id="3" name="Content Placeholder 2">
@@ -4611,13 +4885,13 @@
               <a:lstStyle/>
               <a:p>
                 <a:r>
-                  <a:rPr lang="en-GB" dirty="0" smtClean="0"/>
+                  <a:rPr lang="en-GB" dirty="0"/>
                   <a:t>Model for RL typically Markov Decision Process (MDP)</a:t>
                 </a:r>
               </a:p>
               <a:p>
                 <a:r>
-                  <a:rPr lang="en-GB" dirty="0" smtClean="0"/>
+                  <a:rPr lang="en-GB" dirty="0"/>
                   <a:t>Policy </a:t>
                 </a:r>
                 <a14:m>
@@ -4674,13 +4948,13 @@
                   </m:oMath>
                 </a14:m>
                 <a:r>
-                  <a:rPr lang="en-GB" dirty="0" smtClean="0"/>
+                  <a:rPr lang="en-GB" dirty="0"/>
                   <a:t> maps states to actions</a:t>
                 </a:r>
               </a:p>
               <a:p>
                 <a:r>
-                  <a:rPr lang="en-GB" dirty="0" smtClean="0"/>
+                  <a:rPr lang="en-GB" dirty="0"/>
                   <a:t>State transitions return immediate rewards </a:t>
                 </a:r>
                 <a14:m>
@@ -4712,18 +4986,18 @@
                     </m:sSub>
                   </m:oMath>
                 </a14:m>
-                <a:endParaRPr lang="en-GB" dirty="0" smtClean="0"/>
+                <a:endParaRPr lang="en-GB" dirty="0"/>
               </a:p>
               <a:p>
                 <a:r>
-                  <a:rPr lang="en-GB" dirty="0" smtClean="0"/>
+                  <a:rPr lang="en-GB" dirty="0"/>
                   <a:t>Goal of RL is to either:</a:t>
                 </a:r>
               </a:p>
               <a:p>
                 <a:pPr lvl="1"/>
                 <a:r>
-                  <a:rPr lang="en-GB" dirty="0" smtClean="0"/>
+                  <a:rPr lang="en-GB" dirty="0"/>
                   <a:t>Learn a Policy </a:t>
                 </a:r>
                 <a14:m>
@@ -4757,14 +5031,14 @@
                   </m:oMath>
                 </a14:m>
                 <a:r>
-                  <a:rPr lang="en-GB" dirty="0" smtClean="0"/>
+                  <a:rPr lang="en-GB" dirty="0"/>
                   <a:t> that maximises expected return</a:t>
                 </a:r>
               </a:p>
               <a:p>
                 <a:pPr lvl="1"/>
                 <a:r>
-                  <a:rPr lang="en-GB" dirty="0" smtClean="0"/>
+                  <a:rPr lang="en-GB" dirty="0"/>
                   <a:t>Learn the optimal Value </a:t>
                 </a:r>
                 <a14:m>
@@ -4815,11 +5089,11 @@
                   </m:oMath>
                 </a14:m>
                 <a:r>
-                  <a:rPr lang="en-GB" dirty="0" smtClean="0"/>
+                  <a:rPr lang="en-GB" dirty="0"/>
                   <a:t> or </a:t>
                 </a:r>
                 <a:r>
-                  <a:rPr lang="en-GB" b="1" dirty="0" smtClean="0"/>
+                  <a:rPr lang="en-GB" b="1" dirty="0"/>
                   <a:t>Action-Value </a:t>
                 </a:r>
                 <a14:m>
@@ -4882,11 +5156,11 @@
                   </m:oMath>
                 </a14:m>
                 <a:r>
-                  <a:rPr lang="en-GB" b="1" dirty="0" smtClean="0"/>
+                  <a:rPr lang="en-GB" b="1" dirty="0"/>
                   <a:t> </a:t>
                 </a:r>
                 <a:r>
-                  <a:rPr lang="en-GB" dirty="0" smtClean="0"/>
+                  <a:rPr lang="en-GB" dirty="0"/>
                   <a:t>function for each state</a:t>
                 </a:r>
               </a:p>
@@ -4896,7 +5170,7 @@
             </p:txBody>
           </p:sp>
         </mc:Choice>
-        <mc:Fallback>
+        <mc:Fallback xmlns="">
           <p:sp>
             <p:nvSpPr>
               <p:cNvPr id="3" name="Content Placeholder 2">
@@ -5010,7 +5284,7 @@
           <a:lstStyle/>
           <a:p>
             <a:r>
-              <a:rPr lang="en-GB" dirty="0" smtClean="0">
+              <a:rPr lang="en-GB" dirty="0">
                 <a:ln w="0"/>
                 <a:effectLst>
                   <a:outerShdw blurRad="38100" dist="19050" dir="2700000" algn="tl" rotWithShape="0">
@@ -5022,16 +5296,6 @@
               </a:rPr>
               <a:t>The Reinforcement Learning Problem</a:t>
             </a:r>
-            <a:endParaRPr lang="en-GB" dirty="0">
-              <a:ln w="0"/>
-              <a:effectLst>
-                <a:outerShdw blurRad="38100" dist="19050" dir="2700000" algn="tl" rotWithShape="0">
-                  <a:schemeClr val="dk1">
-                    <a:alpha val="40000"/>
-                  </a:schemeClr>
-                </a:outerShdw>
-              </a:effectLst>
-            </a:endParaRPr>
           </a:p>
         </p:txBody>
       </p:sp>
@@ -5105,33 +5369,7 @@
                   </a:outerShdw>
                 </a:effectLst>
               </a:rPr>
-              <a:t>Atari </a:t>
-            </a:r>
-            <a:r>
-              <a:rPr lang="en-GB" dirty="0" smtClean="0">
-                <a:ln w="0"/>
-                <a:effectLst>
-                  <a:outerShdw blurRad="38100" dist="19050" dir="2700000" algn="tl" rotWithShape="0">
-                    <a:schemeClr val="dk1">
-                      <a:alpha val="40000"/>
-                    </a:schemeClr>
-                  </a:outerShdw>
-                </a:effectLst>
-              </a:rPr>
-              <a:t>2600 in Arcade Learning </a:t>
-            </a:r>
-            <a:r>
-              <a:rPr lang="en-GB" dirty="0">
-                <a:ln w="0"/>
-                <a:effectLst>
-                  <a:outerShdw blurRad="38100" dist="19050" dir="2700000" algn="tl" rotWithShape="0">
-                    <a:schemeClr val="dk1">
-                      <a:alpha val="40000"/>
-                    </a:schemeClr>
-                  </a:outerShdw>
-                </a:effectLst>
-              </a:rPr>
-              <a:t>Environment</a:t>
+              <a:t>Atari 2600 in Arcade Learning Environment</a:t>
             </a:r>
           </a:p>
         </p:txBody>
@@ -5212,18 +5450,17 @@
             <a:lstStyle/>
             <a:p>
               <a:r>
-                <a:rPr lang="en-GB" b="1" dirty="0" smtClean="0"/>
+                <a:rPr lang="en-GB" b="1" dirty="0"/>
                 <a:t>Five Atari Games: Pong, Breakout, Space Invaders, </a:t>
               </a:r>
               <a:r>
-                <a:rPr lang="en-GB" b="1" dirty="0" err="1" smtClean="0"/>
+                <a:rPr lang="en-GB" b="1" dirty="0" err="1"/>
                 <a:t>Seaquest</a:t>
               </a:r>
               <a:r>
-                <a:rPr lang="en-GB" b="1" dirty="0" smtClean="0"/>
+                <a:rPr lang="en-GB" b="1" dirty="0"/>
                 <a:t>, Beam Rider</a:t>
               </a:r>
-              <a:endParaRPr lang="en-GB" b="1" dirty="0"/>
             </a:p>
           </p:txBody>
         </p:sp>
@@ -5258,16 +5495,8 @@
               <a:buChar char="•"/>
             </a:pPr>
             <a:r>
-              <a:rPr lang="en-GB" sz="2400" dirty="0" smtClean="0"/>
-              <a:t>Challenging testbed for RL &amp; interesting </a:t>
-            </a:r>
-            <a:r>
               <a:rPr lang="en-GB" sz="2400" dirty="0"/>
-              <a:t>set of </a:t>
-            </a:r>
-            <a:r>
-              <a:rPr lang="en-GB" sz="2400" dirty="0" smtClean="0"/>
-              <a:t>tasks</a:t>
+              <a:t>Challenging testbed for RL &amp; interesting set of tasks</a:t>
             </a:r>
           </a:p>
           <a:p>
@@ -5279,7 +5508,7 @@
               <a:buChar char="•"/>
             </a:pPr>
             <a:r>
-              <a:rPr lang="en-GB" sz="2400" dirty="0" smtClean="0"/>
+              <a:rPr lang="en-GB" sz="2400" dirty="0"/>
               <a:t>High Dimensional Visual Input (210x160 RGB @ 60Hz)</a:t>
             </a:r>
           </a:p>
@@ -5292,11 +5521,11 @@
               <a:buChar char="•"/>
             </a:pPr>
             <a:r>
-              <a:rPr lang="en-GB" sz="2400" i="1" dirty="0" smtClean="0"/>
+              <a:rPr lang="en-GB" sz="2400" i="1" dirty="0"/>
               <a:t>Note</a:t>
             </a:r>
             <a:r>
-              <a:rPr lang="en-GB" sz="2400" dirty="0" smtClean="0"/>
+              <a:rPr lang="en-GB" sz="2400" dirty="0"/>
               <a:t>: Each state is sequence of actions &amp; observations</a:t>
             </a:r>
           </a:p>
@@ -5362,7 +5591,7 @@
           <a:lstStyle/>
           <a:p>
             <a:r>
-              <a:rPr lang="en-GB" dirty="0" smtClean="0">
+              <a:rPr lang="en-GB" dirty="0">
                 <a:ln w="0"/>
                 <a:effectLst>
                   <a:outerShdw blurRad="38100" dist="19050" dir="2700000" algn="tl" rotWithShape="0">
@@ -5374,16 +5603,6 @@
               </a:rPr>
               <a:t>Q-Network</a:t>
             </a:r>
-            <a:endParaRPr lang="en-GB" dirty="0">
-              <a:ln w="0"/>
-              <a:effectLst>
-                <a:outerShdw blurRad="38100" dist="19050" dir="2700000" algn="tl" rotWithShape="0">
-                  <a:schemeClr val="dk1">
-                    <a:alpha val="40000"/>
-                  </a:schemeClr>
-                </a:outerShdw>
-              </a:effectLst>
-            </a:endParaRPr>
           </a:p>
         </p:txBody>
       </p:sp>
@@ -5427,8 +5646,8 @@
           </a:prstGeom>
         </p:spPr>
       </p:pic>
-      <mc:AlternateContent xmlns:mc="http://schemas.openxmlformats.org/markup-compatibility/2006">
-        <mc:Choice xmlns:a14="http://schemas.microsoft.com/office/drawing/2010/main" Requires="a14">
+      <mc:AlternateContent xmlns:mc="http://schemas.openxmlformats.org/markup-compatibility/2006" xmlns:a14="http://schemas.microsoft.com/office/drawing/2010/main">
+        <mc:Choice Requires="a14">
           <p:sp>
             <p:nvSpPr>
               <p:cNvPr id="6" name="Rectangle 5"/>
@@ -5450,6 +5669,7 @@
               </a:bodyPr>
               <a:lstStyle/>
               <a:p>
+                <a:pPr/>
                 <a14:m>
                   <m:oMathPara xmlns:m="http://schemas.openxmlformats.org/officeDocument/2006/math">
                     <m:oMathParaPr>
@@ -5577,7 +5797,7 @@
             </p:txBody>
           </p:sp>
         </mc:Choice>
-        <mc:Fallback>
+        <mc:Fallback xmlns="">
           <p:sp>
             <p:nvSpPr>
               <p:cNvPr id="6" name="Rectangle 5"/>
@@ -5671,13 +5891,8 @@
             <a:pPr algn="ctr"/>
             <a:r>
               <a:rPr lang="en-GB" sz="2000" b="1" dirty="0"/>
-              <a:t>Use neural network function </a:t>
-            </a:r>
-            <a:r>
-              <a:rPr lang="en-GB" sz="2000" b="1" dirty="0" smtClean="0"/>
-              <a:t>approximator instead</a:t>
-            </a:r>
-            <a:endParaRPr lang="en-GB" sz="2000" b="1" dirty="0"/>
+              <a:t>Use neural network function approximator instead</a:t>
+            </a:r>
           </a:p>
         </p:txBody>
       </p:sp>
@@ -5860,7 +6075,7 @@
         </p:blipFill>
         <p:spPr>
           <a:xfrm>
-            <a:off x="1917031" y="1690688"/>
+            <a:off x="1800726" y="1407076"/>
             <a:ext cx="8590547" cy="4557399"/>
           </a:xfrm>
           <a:prstGeom prst="rect">
@@ -5871,6 +6086,337 @@
           </a:ln>
         </p:spPr>
       </p:pic>
+      <mc:AlternateContent xmlns:mc="http://schemas.openxmlformats.org/markup-compatibility/2006">
+        <mc:Choice xmlns:a14="http://schemas.microsoft.com/office/drawing/2010/main" Requires="a14">
+          <p:sp>
+            <p:nvSpPr>
+              <p:cNvPr id="3" name="TextBox 2">
+                <a:extLst>
+                  <a:ext uri="{FF2B5EF4-FFF2-40B4-BE49-F238E27FC236}">
+                    <a16:creationId xmlns:a16="http://schemas.microsoft.com/office/drawing/2014/main" id="{67F76A68-9D1D-4B90-B63F-47DD15B1C40E}"/>
+                  </a:ext>
+                </a:extLst>
+              </p:cNvPr>
+              <p:cNvSpPr txBox="1"/>
+              <p:nvPr/>
+            </p:nvSpPr>
+            <p:spPr>
+              <a:xfrm>
+                <a:off x="6877319" y="5964475"/>
+                <a:ext cx="5035639" cy="646331"/>
+              </a:xfrm>
+              <a:prstGeom prst="rect">
+                <a:avLst/>
+              </a:prstGeom>
+              <a:noFill/>
+            </p:spPr>
+            <p:txBody>
+              <a:bodyPr wrap="square" rtlCol="0">
+                <a:spAutoFit/>
+              </a:bodyPr>
+              <a:lstStyle/>
+              <a:p>
+                <a:r>
+                  <a:rPr lang="en-GB" b="0" dirty="0"/>
+                  <a:t>Agents experiences stored at each time step into dataset </a:t>
+                </a:r>
+                <a14:m>
+                  <m:oMath xmlns:m="http://schemas.openxmlformats.org/officeDocument/2006/math">
+                    <m:r>
+                      <a:rPr lang="en-GB" b="0" i="1" smtClean="0">
+                        <a:latin typeface="Cambria Math" panose="02040503050406030204" pitchFamily="18" charset="0"/>
+                      </a:rPr>
+                      <m:t>𝐷</m:t>
+                    </m:r>
+                    <m:r>
+                      <a:rPr lang="en-GB" b="0" i="1" smtClean="0">
+                        <a:latin typeface="Cambria Math" panose="02040503050406030204" pitchFamily="18" charset="0"/>
+                      </a:rPr>
+                      <m:t>=</m:t>
+                    </m:r>
+                    <m:sSub>
+                      <m:sSubPr>
+                        <m:ctrlPr>
+                          <a:rPr lang="en-GB" b="0" i="1" smtClean="0">
+                            <a:latin typeface="Cambria Math" panose="02040503050406030204" pitchFamily="18" charset="0"/>
+                          </a:rPr>
+                        </m:ctrlPr>
+                      </m:sSubPr>
+                      <m:e>
+                        <m:r>
+                          <a:rPr lang="en-GB" b="0" i="1" smtClean="0">
+                            <a:latin typeface="Cambria Math" panose="02040503050406030204" pitchFamily="18" charset="0"/>
+                          </a:rPr>
+                          <m:t>𝑒</m:t>
+                        </m:r>
+                      </m:e>
+                      <m:sub>
+                        <m:r>
+                          <a:rPr lang="en-GB" b="0" i="1" smtClean="0">
+                            <a:latin typeface="Cambria Math" panose="02040503050406030204" pitchFamily="18" charset="0"/>
+                          </a:rPr>
+                          <m:t>1</m:t>
+                        </m:r>
+                      </m:sub>
+                    </m:sSub>
+                    <m:r>
+                      <a:rPr lang="en-GB" b="0" i="1" smtClean="0">
+                        <a:latin typeface="Cambria Math" panose="02040503050406030204" pitchFamily="18" charset="0"/>
+                      </a:rPr>
+                      <m:t>,…</m:t>
+                    </m:r>
+                    <m:r>
+                      <a:rPr lang="en-GB" b="0" i="0" smtClean="0">
+                        <a:latin typeface="Cambria Math" panose="02040503050406030204" pitchFamily="18" charset="0"/>
+                      </a:rPr>
+                      <m:t>,</m:t>
+                    </m:r>
+                    <m:sSub>
+                      <m:sSubPr>
+                        <m:ctrlPr>
+                          <a:rPr lang="en-GB" b="0" i="1" smtClean="0">
+                            <a:latin typeface="Cambria Math" panose="02040503050406030204" pitchFamily="18" charset="0"/>
+                          </a:rPr>
+                        </m:ctrlPr>
+                      </m:sSubPr>
+                      <m:e>
+                        <m:r>
+                          <a:rPr lang="en-GB" b="0" i="1" smtClean="0">
+                            <a:latin typeface="Cambria Math" panose="02040503050406030204" pitchFamily="18" charset="0"/>
+                          </a:rPr>
+                          <m:t>𝑒</m:t>
+                        </m:r>
+                      </m:e>
+                      <m:sub>
+                        <m:r>
+                          <a:rPr lang="en-GB" b="0" i="1" smtClean="0">
+                            <a:latin typeface="Cambria Math" panose="02040503050406030204" pitchFamily="18" charset="0"/>
+                          </a:rPr>
+                          <m:t>𝑛</m:t>
+                        </m:r>
+                      </m:sub>
+                    </m:sSub>
+                  </m:oMath>
+                </a14:m>
+                <a:r>
+                  <a:rPr lang="en-GB" dirty="0"/>
+                  <a:t> where </a:t>
+                </a:r>
+                <a14:m>
+                  <m:oMath xmlns:m="http://schemas.openxmlformats.org/officeDocument/2006/math">
+                    <m:sSub>
+                      <m:sSubPr>
+                        <m:ctrlPr>
+                          <a:rPr lang="en-GB" i="1" smtClean="0">
+                            <a:latin typeface="Cambria Math" panose="02040503050406030204" pitchFamily="18" charset="0"/>
+                          </a:rPr>
+                        </m:ctrlPr>
+                      </m:sSubPr>
+                      <m:e>
+                        <m:r>
+                          <a:rPr lang="en-GB" b="0" i="1" smtClean="0">
+                            <a:latin typeface="Cambria Math" panose="02040503050406030204" pitchFamily="18" charset="0"/>
+                          </a:rPr>
+                          <m:t>𝑒</m:t>
+                        </m:r>
+                      </m:e>
+                      <m:sub>
+                        <m:r>
+                          <a:rPr lang="en-GB" b="0" i="1" smtClean="0">
+                            <a:latin typeface="Cambria Math" panose="02040503050406030204" pitchFamily="18" charset="0"/>
+                          </a:rPr>
+                          <m:t>𝑡</m:t>
+                        </m:r>
+                      </m:sub>
+                    </m:sSub>
+                    <m:r>
+                      <a:rPr lang="en-GB" b="0" i="1" smtClean="0">
+                        <a:latin typeface="Cambria Math" panose="02040503050406030204" pitchFamily="18" charset="0"/>
+                      </a:rPr>
+                      <m:t>=(</m:t>
+                    </m:r>
+                    <m:sSub>
+                      <m:sSubPr>
+                        <m:ctrlPr>
+                          <a:rPr lang="en-GB" b="0" i="1" smtClean="0">
+                            <a:latin typeface="Cambria Math" panose="02040503050406030204" pitchFamily="18" charset="0"/>
+                          </a:rPr>
+                        </m:ctrlPr>
+                      </m:sSubPr>
+                      <m:e>
+                        <m:r>
+                          <a:rPr lang="en-GB" b="0" i="1" smtClean="0">
+                            <a:latin typeface="Cambria Math" panose="02040503050406030204" pitchFamily="18" charset="0"/>
+                          </a:rPr>
+                          <m:t>𝑠</m:t>
+                        </m:r>
+                      </m:e>
+                      <m:sub>
+                        <m:r>
+                          <a:rPr lang="en-GB" b="0" i="1" smtClean="0">
+                            <a:latin typeface="Cambria Math" panose="02040503050406030204" pitchFamily="18" charset="0"/>
+                          </a:rPr>
+                          <m:t>𝑡</m:t>
+                        </m:r>
+                      </m:sub>
+                    </m:sSub>
+                    <m:r>
+                      <a:rPr lang="en-GB" b="0" i="1" smtClean="0">
+                        <a:latin typeface="Cambria Math" panose="02040503050406030204" pitchFamily="18" charset="0"/>
+                      </a:rPr>
+                      <m:t>,</m:t>
+                    </m:r>
+                    <m:sSub>
+                      <m:sSubPr>
+                        <m:ctrlPr>
+                          <a:rPr lang="en-GB" b="0" i="1" smtClean="0">
+                            <a:latin typeface="Cambria Math" panose="02040503050406030204" pitchFamily="18" charset="0"/>
+                          </a:rPr>
+                        </m:ctrlPr>
+                      </m:sSubPr>
+                      <m:e>
+                        <m:r>
+                          <a:rPr lang="en-GB" b="0" i="1" smtClean="0">
+                            <a:latin typeface="Cambria Math" panose="02040503050406030204" pitchFamily="18" charset="0"/>
+                          </a:rPr>
+                          <m:t>𝑎</m:t>
+                        </m:r>
+                      </m:e>
+                      <m:sub>
+                        <m:r>
+                          <a:rPr lang="en-GB" b="0" i="1" smtClean="0">
+                            <a:latin typeface="Cambria Math" panose="02040503050406030204" pitchFamily="18" charset="0"/>
+                          </a:rPr>
+                          <m:t>𝑡</m:t>
+                        </m:r>
+                      </m:sub>
+                    </m:sSub>
+                    <m:r>
+                      <a:rPr lang="en-GB" b="0" i="1" smtClean="0">
+                        <a:latin typeface="Cambria Math" panose="02040503050406030204" pitchFamily="18" charset="0"/>
+                      </a:rPr>
+                      <m:t>,</m:t>
+                    </m:r>
+                    <m:sSub>
+                      <m:sSubPr>
+                        <m:ctrlPr>
+                          <a:rPr lang="en-GB" b="0" i="1" smtClean="0">
+                            <a:latin typeface="Cambria Math" panose="02040503050406030204" pitchFamily="18" charset="0"/>
+                          </a:rPr>
+                        </m:ctrlPr>
+                      </m:sSubPr>
+                      <m:e>
+                        <m:r>
+                          <a:rPr lang="en-GB" b="0" i="1" smtClean="0">
+                            <a:latin typeface="Cambria Math" panose="02040503050406030204" pitchFamily="18" charset="0"/>
+                          </a:rPr>
+                          <m:t>𝑟</m:t>
+                        </m:r>
+                      </m:e>
+                      <m:sub>
+                        <m:r>
+                          <a:rPr lang="en-GB" b="0" i="1" smtClean="0">
+                            <a:latin typeface="Cambria Math" panose="02040503050406030204" pitchFamily="18" charset="0"/>
+                          </a:rPr>
+                          <m:t>𝑡</m:t>
+                        </m:r>
+                      </m:sub>
+                    </m:sSub>
+                    <m:r>
+                      <a:rPr lang="en-GB" b="0" i="1" smtClean="0">
+                        <a:latin typeface="Cambria Math" panose="02040503050406030204" pitchFamily="18" charset="0"/>
+                      </a:rPr>
+                      <m:t>,</m:t>
+                    </m:r>
+                    <m:sSub>
+                      <m:sSubPr>
+                        <m:ctrlPr>
+                          <a:rPr lang="en-GB" b="0" i="1" smtClean="0">
+                            <a:latin typeface="Cambria Math" panose="02040503050406030204" pitchFamily="18" charset="0"/>
+                          </a:rPr>
+                        </m:ctrlPr>
+                      </m:sSubPr>
+                      <m:e>
+                        <m:r>
+                          <a:rPr lang="en-GB" b="0" i="1" smtClean="0">
+                            <a:latin typeface="Cambria Math" panose="02040503050406030204" pitchFamily="18" charset="0"/>
+                          </a:rPr>
+                          <m:t>𝑠</m:t>
+                        </m:r>
+                      </m:e>
+                      <m:sub>
+                        <m:r>
+                          <a:rPr lang="en-GB" b="0" i="1" smtClean="0">
+                            <a:latin typeface="Cambria Math" panose="02040503050406030204" pitchFamily="18" charset="0"/>
+                          </a:rPr>
+                          <m:t>𝑡</m:t>
+                        </m:r>
+                        <m:r>
+                          <a:rPr lang="en-GB" b="0" i="1" smtClean="0">
+                            <a:latin typeface="Cambria Math" panose="02040503050406030204" pitchFamily="18" charset="0"/>
+                          </a:rPr>
+                          <m:t>+1</m:t>
+                        </m:r>
+                      </m:sub>
+                    </m:sSub>
+                    <m:r>
+                      <a:rPr lang="en-GB" b="0" i="1" smtClean="0">
+                        <a:latin typeface="Cambria Math" panose="02040503050406030204" pitchFamily="18" charset="0"/>
+                      </a:rPr>
+                      <m:t>,)</m:t>
+                    </m:r>
+                  </m:oMath>
+                </a14:m>
+                <a:endParaRPr lang="en-GB" dirty="0"/>
+              </a:p>
+            </p:txBody>
+          </p:sp>
+        </mc:Choice>
+        <mc:Fallback>
+          <p:sp>
+            <p:nvSpPr>
+              <p:cNvPr id="3" name="TextBox 2">
+                <a:extLst>
+                  <a:ext uri="{FF2B5EF4-FFF2-40B4-BE49-F238E27FC236}">
+                    <a16:creationId xmlns:a16="http://schemas.microsoft.com/office/drawing/2014/main" id="{67F76A68-9D1D-4B90-B63F-47DD15B1C40E}"/>
+                  </a:ext>
+                </a:extLst>
+              </p:cNvPr>
+              <p:cNvSpPr txBox="1">
+                <a:spLocks noRot="1" noChangeAspect="1" noMove="1" noResize="1" noEditPoints="1" noAdjustHandles="1" noChangeArrowheads="1" noChangeShapeType="1" noTextEdit="1"/>
+              </p:cNvSpPr>
+              <p:nvPr/>
+            </p:nvSpPr>
+            <p:spPr>
+              <a:xfrm>
+                <a:off x="6877319" y="5964475"/>
+                <a:ext cx="5035639" cy="646331"/>
+              </a:xfrm>
+              <a:prstGeom prst="rect">
+                <a:avLst/>
+              </a:prstGeom>
+              <a:blipFill>
+                <a:blip r:embed="rId5"/>
+                <a:stretch>
+                  <a:fillRect l="-969" t="-4717" b="-14151"/>
+                </a:stretch>
+              </a:blipFill>
+            </p:spPr>
+            <p:txBody>
+              <a:bodyPr/>
+              <a:lstStyle/>
+              <a:p>
+                <a:r>
+                  <a:rPr lang="en-GB">
+                    <a:noFill/>
+                  </a:rPr>
+                  <a:t> </a:t>
+                </a:r>
+              </a:p>
+            </p:txBody>
+          </p:sp>
+        </mc:Fallback>
+      </mc:AlternateContent>
     </p:spTree>
     <p:custDataLst>
       <p:tags r:id="rId1"/>
@@ -5932,6 +6478,277 @@
           </a:p>
         </p:txBody>
       </p:sp>
+      <mc:AlternateContent xmlns:mc="http://schemas.openxmlformats.org/markup-compatibility/2006">
+        <mc:Choice xmlns:a14="http://schemas.microsoft.com/office/drawing/2010/main" Requires="a14">
+          <p:sp>
+            <p:nvSpPr>
+              <p:cNvPr id="3" name="TextBox 2">
+                <a:extLst>
+                  <a:ext uri="{FF2B5EF4-FFF2-40B4-BE49-F238E27FC236}">
+                    <a16:creationId xmlns:a16="http://schemas.microsoft.com/office/drawing/2014/main" id="{9B80D7E1-ABEC-4FBC-84D6-327B354E9866}"/>
+                  </a:ext>
+                </a:extLst>
+              </p:cNvPr>
+              <p:cNvSpPr txBox="1"/>
+              <p:nvPr/>
+            </p:nvSpPr>
+            <p:spPr>
+              <a:xfrm>
+                <a:off x="1056067" y="1690688"/>
+                <a:ext cx="8229601" cy="3139321"/>
+              </a:xfrm>
+              <a:prstGeom prst="rect">
+                <a:avLst/>
+              </a:prstGeom>
+              <a:noFill/>
+            </p:spPr>
+            <p:txBody>
+              <a:bodyPr wrap="square" rtlCol="0">
+                <a:spAutoFit/>
+              </a:bodyPr>
+              <a:lstStyle/>
+              <a:p>
+                <a:pPr marL="285750" indent="-285750">
+                  <a:buFont typeface="Arial" panose="020B0604020202020204" pitchFamily="34" charset="0"/>
+                  <a:buChar char="•"/>
+                </a:pPr>
+                <a:r>
+                  <a:rPr lang="en-GB" dirty="0"/>
+                  <a:t>Pre-Processing</a:t>
+                </a:r>
+              </a:p>
+              <a:p>
+                <a:pPr marL="742950" lvl="1" indent="-285750">
+                  <a:buFont typeface="Arial" panose="020B0604020202020204" pitchFamily="34" charset="0"/>
+                  <a:buChar char="•"/>
+                </a:pPr>
+                <a:r>
+                  <a:rPr lang="en-GB" dirty="0"/>
+                  <a:t>RGB -&gt; Grey-Scale</a:t>
+                </a:r>
+              </a:p>
+              <a:p>
+                <a:pPr marL="742950" lvl="1" indent="-285750">
+                  <a:buFont typeface="Arial" panose="020B0604020202020204" pitchFamily="34" charset="0"/>
+                  <a:buChar char="•"/>
+                </a:pPr>
+                <a:r>
+                  <a:rPr lang="en-GB" dirty="0"/>
+                  <a:t>210x160 is Down-Sampled to 110x84</a:t>
+                </a:r>
+              </a:p>
+              <a:p>
+                <a:pPr marL="742950" lvl="1" indent="-285750">
+                  <a:buFont typeface="Arial" panose="020B0604020202020204" pitchFamily="34" charset="0"/>
+                  <a:buChar char="•"/>
+                </a:pPr>
+                <a:r>
+                  <a:rPr lang="en-GB" dirty="0"/>
+                  <a:t>84x84 cropped region</a:t>
+                </a:r>
+              </a:p>
+              <a:p>
+                <a:pPr marL="285750" indent="-285750">
+                  <a:buFont typeface="Arial" panose="020B0604020202020204" pitchFamily="34" charset="0"/>
+                  <a:buChar char="•"/>
+                </a:pPr>
+                <a:r>
+                  <a:rPr lang="en-GB" dirty="0">
+                    <a:ea typeface="Cambria Math" panose="02040503050406030204" pitchFamily="18" charset="0"/>
+                  </a:rPr>
+                  <a:t>Function </a:t>
+                </a:r>
+                <a14:m>
+                  <m:oMath xmlns:m="http://schemas.openxmlformats.org/officeDocument/2006/math">
+                    <m:r>
+                      <a:rPr lang="en-GB" i="1" smtClean="0">
+                        <a:latin typeface="Cambria Math" panose="02040503050406030204" pitchFamily="18" charset="0"/>
+                        <a:ea typeface="Cambria Math" panose="02040503050406030204" pitchFamily="18" charset="0"/>
+                      </a:rPr>
+                      <m:t>𝜙</m:t>
+                    </m:r>
+                    <m:r>
+                      <a:rPr lang="en-GB" b="0" i="1" smtClean="0">
+                        <a:latin typeface="Cambria Math" panose="02040503050406030204" pitchFamily="18" charset="0"/>
+                        <a:ea typeface="Cambria Math" panose="02040503050406030204" pitchFamily="18" charset="0"/>
+                      </a:rPr>
+                      <m:t>(</m:t>
+                    </m:r>
+                    <m:r>
+                      <a:rPr lang="en-GB" b="0" i="1" smtClean="0">
+                        <a:latin typeface="Cambria Math" panose="02040503050406030204" pitchFamily="18" charset="0"/>
+                        <a:ea typeface="Cambria Math" panose="02040503050406030204" pitchFamily="18" charset="0"/>
+                      </a:rPr>
+                      <m:t>𝑠</m:t>
+                    </m:r>
+                    <m:r>
+                      <a:rPr lang="en-GB" b="0" i="1" smtClean="0">
+                        <a:latin typeface="Cambria Math" panose="02040503050406030204" pitchFamily="18" charset="0"/>
+                        <a:ea typeface="Cambria Math" panose="02040503050406030204" pitchFamily="18" charset="0"/>
+                      </a:rPr>
+                      <m:t>)</m:t>
+                    </m:r>
+                  </m:oMath>
+                </a14:m>
+                <a:r>
+                  <a:rPr lang="en-GB" dirty="0"/>
+                  <a:t> stacks 4 processed histories for input to the Q-network (84 x 84 x 4)</a:t>
+                </a:r>
+              </a:p>
+              <a:p>
+                <a:pPr marL="285750" indent="-285750">
+                  <a:buFont typeface="Arial" panose="020B0604020202020204" pitchFamily="34" charset="0"/>
+                  <a:buChar char="•"/>
+                </a:pPr>
+                <a:r>
+                  <a:rPr lang="en-GB" dirty="0"/>
+                  <a:t>Network outputs predicted Q-Values for each action </a:t>
+                </a:r>
+                <a14:m>
+                  <m:oMath xmlns:m="http://schemas.openxmlformats.org/officeDocument/2006/math">
+                    <m:d>
+                      <m:dPr>
+                        <m:begChr m:val="|"/>
+                        <m:endChr m:val="|"/>
+                        <m:ctrlPr>
+                          <a:rPr lang="en-GB" b="0" i="1" smtClean="0">
+                            <a:latin typeface="Cambria Math" panose="02040503050406030204" pitchFamily="18" charset="0"/>
+                          </a:rPr>
+                        </m:ctrlPr>
+                      </m:dPr>
+                      <m:e>
+                        <m:r>
+                          <a:rPr lang="en-GB" b="0" i="1" smtClean="0">
+                            <a:latin typeface="Cambria Math" panose="02040503050406030204" pitchFamily="18" charset="0"/>
+                          </a:rPr>
+                          <m:t>𝐴</m:t>
+                        </m:r>
+                      </m:e>
+                    </m:d>
+                    <m:r>
+                      <a:rPr lang="en-GB" b="0" i="1" smtClean="0">
+                        <a:latin typeface="Cambria Math" panose="02040503050406030204" pitchFamily="18" charset="0"/>
+                      </a:rPr>
+                      <m:t>=[4,18]</m:t>
+                    </m:r>
+                  </m:oMath>
+                </a14:m>
+                <a:endParaRPr lang="en-GB" dirty="0"/>
+              </a:p>
+              <a:p>
+                <a:pPr marL="285750" indent="-285750">
+                  <a:buFont typeface="Arial" panose="020B0604020202020204" pitchFamily="34" charset="0"/>
+                  <a:buChar char="•"/>
+                </a:pPr>
+                <a:r>
+                  <a:rPr lang="en-GB" dirty="0"/>
+                  <a:t>Hidden Layers:</a:t>
+                </a:r>
+              </a:p>
+              <a:p>
+                <a:pPr marL="800100" lvl="1" indent="-342900">
+                  <a:buFont typeface="+mj-lt"/>
+                  <a:buAutoNum type="arabicPeriod"/>
+                </a:pPr>
+                <a:r>
+                  <a:rPr lang="en-GB" dirty="0"/>
+                  <a:t>16 8x8 filters with stride 4 then </a:t>
+                </a:r>
+                <a:r>
+                  <a:rPr lang="en-GB" dirty="0" err="1"/>
+                  <a:t>ReLU</a:t>
+                </a:r>
+                <a:r>
+                  <a:rPr lang="en-GB" dirty="0"/>
+                  <a:t> activation</a:t>
+                </a:r>
+              </a:p>
+              <a:p>
+                <a:pPr marL="800100" lvl="1" indent="-342900">
+                  <a:buFont typeface="+mj-lt"/>
+                  <a:buAutoNum type="arabicPeriod"/>
+                </a:pPr>
+                <a:r>
+                  <a:rPr lang="en-GB" dirty="0"/>
+                  <a:t>32 4x4 filters with stride 2 the </a:t>
+                </a:r>
+                <a:r>
+                  <a:rPr lang="en-GB" dirty="0" err="1"/>
+                  <a:t>ReLU</a:t>
+                </a:r>
+                <a:r>
+                  <a:rPr lang="en-GB" dirty="0"/>
+                  <a:t> activation</a:t>
+                </a:r>
+              </a:p>
+              <a:p>
+                <a:pPr marL="800100" lvl="1" indent="-342900">
+                  <a:buFont typeface="+mj-lt"/>
+                  <a:buAutoNum type="arabicPeriod"/>
+                </a:pPr>
+                <a:r>
+                  <a:rPr lang="en-GB" dirty="0"/>
+                  <a:t>Fully connected layer with 256 rectifier units.</a:t>
+                </a:r>
+              </a:p>
+              <a:p>
+                <a:pPr marL="342900" indent="-342900">
+                  <a:buFont typeface="Arial" panose="020B0604020202020204" pitchFamily="34" charset="0"/>
+                  <a:buChar char="•"/>
+                </a:pPr>
+                <a:r>
+                  <a:rPr lang="en-GB" dirty="0"/>
+                  <a:t>Fully-Connected linear layer with output for each action.</a:t>
+                </a:r>
+              </a:p>
+            </p:txBody>
+          </p:sp>
+        </mc:Choice>
+        <mc:Fallback>
+          <p:sp>
+            <p:nvSpPr>
+              <p:cNvPr id="3" name="TextBox 2">
+                <a:extLst>
+                  <a:ext uri="{FF2B5EF4-FFF2-40B4-BE49-F238E27FC236}">
+                    <a16:creationId xmlns:a16="http://schemas.microsoft.com/office/drawing/2014/main" id="{9B80D7E1-ABEC-4FBC-84D6-327B354E9866}"/>
+                  </a:ext>
+                </a:extLst>
+              </p:cNvPr>
+              <p:cNvSpPr txBox="1">
+                <a:spLocks noRot="1" noChangeAspect="1" noMove="1" noResize="1" noEditPoints="1" noAdjustHandles="1" noChangeArrowheads="1" noChangeShapeType="1" noTextEdit="1"/>
+              </p:cNvSpPr>
+              <p:nvPr/>
+            </p:nvSpPr>
+            <p:spPr>
+              <a:xfrm>
+                <a:off x="1056067" y="1690688"/>
+                <a:ext cx="8229601" cy="3139321"/>
+              </a:xfrm>
+              <a:prstGeom prst="rect">
+                <a:avLst/>
+              </a:prstGeom>
+              <a:blipFill>
+                <a:blip r:embed="rId4"/>
+                <a:stretch>
+                  <a:fillRect l="-444" t="-971" b="-2136"/>
+                </a:stretch>
+              </a:blipFill>
+            </p:spPr>
+            <p:txBody>
+              <a:bodyPr/>
+              <a:lstStyle/>
+              <a:p>
+                <a:r>
+                  <a:rPr lang="en-GB">
+                    <a:noFill/>
+                  </a:rPr>
+                  <a:t> </a:t>
+                </a:r>
+              </a:p>
+            </p:txBody>
+          </p:sp>
+        </mc:Fallback>
+      </mc:AlternateContent>
     </p:spTree>
     <p:custDataLst>
       <p:tags r:id="rId1"/>
@@ -5939,6 +6756,251 @@
     <p:extLst>
       <p:ext uri="{BB962C8B-B14F-4D97-AF65-F5344CB8AC3E}">
         <p14:creationId xmlns:p14="http://schemas.microsoft.com/office/powerpoint/2010/main" val="3177913439"/>
+      </p:ext>
+    </p:extLst>
+  </p:cSld>
+  <p:clrMapOvr>
+    <a:masterClrMapping/>
+  </p:clrMapOvr>
+</p:sld>
+</file>
+
+<file path=ppt/slides/slide8.xml><?xml version="1.0" encoding="utf-8"?>
+<p:sld xmlns:a="http://schemas.openxmlformats.org/drawingml/2006/main" xmlns:r="http://schemas.openxmlformats.org/officeDocument/2006/relationships" xmlns:p="http://schemas.openxmlformats.org/presentationml/2006/main">
+  <p:cSld>
+    <p:spTree>
+      <p:nvGrpSpPr>
+        <p:cNvPr id="1" name=""/>
+        <p:cNvGrpSpPr/>
+        <p:nvPr/>
+      </p:nvGrpSpPr>
+      <p:grpSpPr>
+        <a:xfrm>
+          <a:off x="0" y="0"/>
+          <a:ext cx="0" cy="0"/>
+          <a:chOff x="0" y="0"/>
+          <a:chExt cx="0" cy="0"/>
+        </a:xfrm>
+      </p:grpSpPr>
+      <p:sp>
+        <p:nvSpPr>
+          <p:cNvPr id="2" name="Title 1">
+            <a:extLst>
+              <a:ext uri="{FF2B5EF4-FFF2-40B4-BE49-F238E27FC236}">
+                <a16:creationId xmlns:a16="http://schemas.microsoft.com/office/drawing/2014/main" id="{C194A1BA-CDD0-461B-8AEB-5C1BF1BE5E68}"/>
+              </a:ext>
+            </a:extLst>
+          </p:cNvPr>
+          <p:cNvSpPr>
+            <a:spLocks noGrp="1"/>
+          </p:cNvSpPr>
+          <p:nvPr>
+            <p:ph type="title"/>
+          </p:nvPr>
+        </p:nvSpPr>
+        <p:spPr>
+          <a:xfrm>
+            <a:off x="838200" y="365126"/>
+            <a:ext cx="2317124" cy="806852"/>
+          </a:xfrm>
+        </p:spPr>
+        <p:txBody>
+          <a:bodyPr/>
+          <a:lstStyle/>
+          <a:p>
+            <a:r>
+              <a:rPr lang="en-GB" dirty="0"/>
+              <a:t>Training</a:t>
+            </a:r>
+          </a:p>
+        </p:txBody>
+      </p:sp>
+      <p:sp>
+        <p:nvSpPr>
+          <p:cNvPr id="4" name="TextBox 3">
+            <a:extLst>
+              <a:ext uri="{FF2B5EF4-FFF2-40B4-BE49-F238E27FC236}">
+                <a16:creationId xmlns:a16="http://schemas.microsoft.com/office/drawing/2014/main" id="{75DCC9D0-17DE-4854-8482-B2A959A5B8A4}"/>
+              </a:ext>
+            </a:extLst>
+          </p:cNvPr>
+          <p:cNvSpPr txBox="1"/>
+          <p:nvPr/>
+        </p:nvSpPr>
+        <p:spPr>
+          <a:xfrm>
+            <a:off x="1197735" y="2009104"/>
+            <a:ext cx="6632619" cy="646331"/>
+          </a:xfrm>
+          <a:prstGeom prst="rect">
+            <a:avLst/>
+          </a:prstGeom>
+          <a:noFill/>
+        </p:spPr>
+        <p:txBody>
+          <a:bodyPr wrap="square" rtlCol="0">
+            <a:spAutoFit/>
+          </a:bodyPr>
+          <a:lstStyle/>
+          <a:p>
+            <a:r>
+              <a:rPr lang="en-GB" dirty="0"/>
+              <a:t>Same agent (architecture, algorithm, hyperparameters) on 7 Atari games but normalised rewards across all games [1,0,-1]</a:t>
+            </a:r>
+          </a:p>
+        </p:txBody>
+      </p:sp>
+      <p:sp>
+        <p:nvSpPr>
+          <p:cNvPr id="5" name="TextBox 4">
+            <a:extLst>
+              <a:ext uri="{FF2B5EF4-FFF2-40B4-BE49-F238E27FC236}">
+                <a16:creationId xmlns:a16="http://schemas.microsoft.com/office/drawing/2014/main" id="{14252F3F-528F-41ED-91F8-70144BDEF06C}"/>
+              </a:ext>
+            </a:extLst>
+          </p:cNvPr>
+          <p:cNvSpPr txBox="1"/>
+          <p:nvPr/>
+        </p:nvSpPr>
+        <p:spPr>
+          <a:xfrm>
+            <a:off x="1596979" y="3116687"/>
+            <a:ext cx="8963697" cy="923330"/>
+          </a:xfrm>
+          <a:prstGeom prst="rect">
+            <a:avLst/>
+          </a:prstGeom>
+          <a:noFill/>
+        </p:spPr>
+        <p:txBody>
+          <a:bodyPr wrap="square" rtlCol="0">
+            <a:spAutoFit/>
+          </a:bodyPr>
+          <a:lstStyle/>
+          <a:p>
+            <a:r>
+              <a:rPr lang="en-GB" dirty="0"/>
+              <a:t>Trained for a total 10 million frames with a replay memory of 1 million most recent frames. </a:t>
+            </a:r>
+          </a:p>
+          <a:p>
+            <a:r>
+              <a:rPr lang="en-GB" dirty="0"/>
+              <a:t>Training with minibatches of size 32. Using a greedy/exploitation policy during training. Learning rate annealed linearly from 1 to 0.1 over the first million frames. </a:t>
+            </a:r>
+          </a:p>
+        </p:txBody>
+      </p:sp>
+      <p:sp>
+        <p:nvSpPr>
+          <p:cNvPr id="6" name="TextBox 5">
+            <a:extLst>
+              <a:ext uri="{FF2B5EF4-FFF2-40B4-BE49-F238E27FC236}">
+                <a16:creationId xmlns:a16="http://schemas.microsoft.com/office/drawing/2014/main" id="{DD2B0BB1-67E2-485B-BA7A-E817FF08EC85}"/>
+              </a:ext>
+            </a:extLst>
+          </p:cNvPr>
+          <p:cNvSpPr txBox="1"/>
+          <p:nvPr/>
+        </p:nvSpPr>
+        <p:spPr>
+          <a:xfrm>
+            <a:off x="2356834" y="4610637"/>
+            <a:ext cx="7675808" cy="369332"/>
+          </a:xfrm>
+          <a:prstGeom prst="rect">
+            <a:avLst/>
+          </a:prstGeom>
+          <a:noFill/>
+        </p:spPr>
+        <p:txBody>
+          <a:bodyPr wrap="square" rtlCol="0">
+            <a:spAutoFit/>
+          </a:bodyPr>
+          <a:lstStyle/>
+          <a:p>
+            <a:r>
+              <a:rPr lang="en-GB" dirty="0"/>
+              <a:t>Frame skipping technique, agent sees and acts every kth frame (k=4)</a:t>
+            </a:r>
+          </a:p>
+        </p:txBody>
+      </p:sp>
+    </p:spTree>
+    <p:custDataLst>
+      <p:tags r:id="rId1"/>
+    </p:custDataLst>
+    <p:extLst>
+      <p:ext uri="{BB962C8B-B14F-4D97-AF65-F5344CB8AC3E}">
+        <p14:creationId xmlns:p14="http://schemas.microsoft.com/office/powerpoint/2010/main" val="4289036692"/>
+      </p:ext>
+    </p:extLst>
+  </p:cSld>
+  <p:clrMapOvr>
+    <a:masterClrMapping/>
+  </p:clrMapOvr>
+</p:sld>
+</file>
+
+<file path=ppt/slides/slide9.xml><?xml version="1.0" encoding="utf-8"?>
+<p:sld xmlns:a="http://schemas.openxmlformats.org/drawingml/2006/main" xmlns:r="http://schemas.openxmlformats.org/officeDocument/2006/relationships" xmlns:p="http://schemas.openxmlformats.org/presentationml/2006/main">
+  <p:cSld>
+    <p:spTree>
+      <p:nvGrpSpPr>
+        <p:cNvPr id="1" name=""/>
+        <p:cNvGrpSpPr/>
+        <p:nvPr/>
+      </p:nvGrpSpPr>
+      <p:grpSpPr>
+        <a:xfrm>
+          <a:off x="0" y="0"/>
+          <a:ext cx="0" cy="0"/>
+          <a:chOff x="0" y="0"/>
+          <a:chExt cx="0" cy="0"/>
+        </a:xfrm>
+      </p:grpSpPr>
+      <p:sp>
+        <p:nvSpPr>
+          <p:cNvPr id="2" name="Title 1">
+            <a:extLst>
+              <a:ext uri="{FF2B5EF4-FFF2-40B4-BE49-F238E27FC236}">
+                <a16:creationId xmlns:a16="http://schemas.microsoft.com/office/drawing/2014/main" id="{281EAB0D-56CB-453E-9B99-068794DC9B07}"/>
+              </a:ext>
+            </a:extLst>
+          </p:cNvPr>
+          <p:cNvSpPr>
+            <a:spLocks noGrp="1"/>
+          </p:cNvSpPr>
+          <p:nvPr>
+            <p:ph type="title"/>
+          </p:nvPr>
+        </p:nvSpPr>
+        <p:spPr>
+          <a:xfrm>
+            <a:off x="838199" y="365125"/>
+            <a:ext cx="4983051" cy="819731"/>
+          </a:xfrm>
+        </p:spPr>
+        <p:txBody>
+          <a:bodyPr>
+            <a:normAutofit fontScale="90000"/>
+          </a:bodyPr>
+          <a:lstStyle/>
+          <a:p>
+            <a:r>
+              <a:rPr lang="en-GB" dirty="0"/>
+              <a:t>Experiments &amp; Results</a:t>
+            </a:r>
+          </a:p>
+        </p:txBody>
+      </p:sp>
+    </p:spTree>
+    <p:custDataLst>
+      <p:tags r:id="rId1"/>
+    </p:custDataLst>
+    <p:extLst>
+      <p:ext uri="{BB962C8B-B14F-4D97-AF65-F5344CB8AC3E}">
+        <p14:creationId xmlns:p14="http://schemas.microsoft.com/office/powerpoint/2010/main" val="3979658909"/>
       </p:ext>
     </p:extLst>
   </p:cSld>
@@ -5991,6 +7053,20 @@
 </file>
 
 <file path=ppt/tags/tag7.xml><?xml version="1.0" encoding="utf-8"?>
+<p:tagLst xmlns:a="http://schemas.openxmlformats.org/drawingml/2006/main" xmlns:r="http://schemas.openxmlformats.org/officeDocument/2006/relationships" xmlns:p="http://schemas.openxmlformats.org/presentationml/2006/main">
+  <p:tag name="POINTS" val="1"/>
+  <p:tag name="TIME" val="15"/>
+</p:tagLst>
+</file>
+
+<file path=ppt/tags/tag8.xml><?xml version="1.0" encoding="utf-8"?>
+<p:tagLst xmlns:a="http://schemas.openxmlformats.org/drawingml/2006/main" xmlns:r="http://schemas.openxmlformats.org/officeDocument/2006/relationships" xmlns:p="http://schemas.openxmlformats.org/presentationml/2006/main">
+  <p:tag name="POINTS" val="1"/>
+  <p:tag name="TIME" val="15"/>
+</p:tagLst>
+</file>
+
+<file path=ppt/tags/tag9.xml><?xml version="1.0" encoding="utf-8"?>
 <p:tagLst xmlns:a="http://schemas.openxmlformats.org/drawingml/2006/main" xmlns:r="http://schemas.openxmlformats.org/officeDocument/2006/relationships" xmlns:p="http://schemas.openxmlformats.org/presentationml/2006/main">
   <p:tag name="POINTS" val="1"/>
   <p:tag name="TIME" val="15"/>

</xml_diff>

<commit_message>
Added results slides and images
</commit_message>
<xml_diff>
--- a/DQN/dqn_slides.pptx
+++ b/DQN/dqn_slides.pptx
@@ -5,7 +5,7 @@
     <p:sldMasterId id="2147483648" r:id="rId1"/>
   </p:sldMasterIdLst>
   <p:notesMasterIdLst>
-    <p:notesMasterId r:id="rId11"/>
+    <p:notesMasterId r:id="rId13"/>
   </p:notesMasterIdLst>
   <p:sldIdLst>
     <p:sldId id="256" r:id="rId2"/>
@@ -17,6 +17,8 @@
     <p:sldId id="278" r:id="rId8"/>
     <p:sldId id="279" r:id="rId9"/>
     <p:sldId id="280" r:id="rId10"/>
+    <p:sldId id="281" r:id="rId11"/>
+    <p:sldId id="282" r:id="rId12"/>
   </p:sldIdLst>
   <p:sldSz cx="12192000" cy="6858000"/>
   <p:notesSz cx="6858000" cy="9144000"/>
@@ -205,7 +207,7 @@
           <a:p>
             <a:fld id="{90B6B2DE-9C7A-410D-BB33-96FD23F82A93}" type="datetimeFigureOut">
               <a:rPr lang="en-GB" smtClean="0"/>
-              <a:t>20/03/2020</a:t>
+              <a:t>22/03/2020</a:t>
             </a:fld>
             <a:endParaRPr lang="en-GB"/>
           </a:p>
@@ -784,6 +786,21 @@
               <a:t>Mention this is model-free RL because we are not using the rest of the model just approximating q-values</a:t>
             </a:r>
           </a:p>
+          <a:p>
+            <a:r>
+              <a:rPr lang="en-GB" dirty="0"/>
+              <a:t>Solves RL problem from the emulator without explicitly constructing an estimate of the emulator.</a:t>
+            </a:r>
+          </a:p>
+          <a:p>
+            <a:endParaRPr lang="en-GB" dirty="0"/>
+          </a:p>
+          <a:p>
+            <a:r>
+              <a:rPr lang="en-GB" dirty="0"/>
+              <a:t>Learns about the greedy strategy (to select the action to maximise q-value) while following the behaviour …</a:t>
+            </a:r>
+          </a:p>
         </p:txBody>
       </p:sp>
       <p:sp>
@@ -906,6 +923,14 @@
               <a:rPr lang="en-GB" baseline="0" dirty="0"/>
               <a:t>Perform Q-learning updates to mini-batches in the inner loop of the algorithm.</a:t>
             </a:r>
+          </a:p>
+          <a:p>
+            <a:endParaRPr lang="en-GB" baseline="0" dirty="0"/>
+          </a:p>
+          <a:p>
+            <a:endParaRPr lang="en-GB" baseline="0" dirty="0"/>
+          </a:p>
+          <a:p>
             <a:endParaRPr lang="en-GB" dirty="0"/>
           </a:p>
         </p:txBody>
@@ -1104,15 +1129,7 @@
             </a:r>
             <a:r>
               <a:rPr lang="en-GB" dirty="0"/>
-              <a:t>, </a:t>
-            </a:r>
-            <a:r>
-              <a:rPr lang="en-GB" dirty="0" err="1"/>
-              <a:t>Seaquest</a:t>
-            </a:r>
-            <a:r>
-              <a:rPr lang="en-GB" dirty="0"/>
-              <a:t>, Space Invaders</a:t>
+              <a:t>, Seaquest, Space Invaders</a:t>
             </a:r>
           </a:p>
           <a:p>
@@ -1202,6 +1219,343 @@
     <p:extLst>
       <p:ext uri="{BB962C8B-B14F-4D97-AF65-F5344CB8AC3E}">
         <p14:creationId xmlns:p14="http://schemas.microsoft.com/office/powerpoint/2010/main" val="3453962627"/>
+      </p:ext>
+    </p:extLst>
+  </p:cSld>
+  <p:clrMapOvr>
+    <a:masterClrMapping/>
+  </p:clrMapOvr>
+</p:notes>
+</file>
+
+<file path=ppt/notesSlides/notesSlide7.xml><?xml version="1.0" encoding="utf-8"?>
+<p:notes xmlns:a="http://schemas.openxmlformats.org/drawingml/2006/main" xmlns:r="http://schemas.openxmlformats.org/officeDocument/2006/relationships" xmlns:p="http://schemas.openxmlformats.org/presentationml/2006/main">
+  <p:cSld>
+    <p:spTree>
+      <p:nvGrpSpPr>
+        <p:cNvPr id="1" name=""/>
+        <p:cNvGrpSpPr/>
+        <p:nvPr/>
+      </p:nvGrpSpPr>
+      <p:grpSpPr>
+        <a:xfrm>
+          <a:off x="0" y="0"/>
+          <a:ext cx="0" cy="0"/>
+          <a:chOff x="0" y="0"/>
+          <a:chExt cx="0" cy="0"/>
+        </a:xfrm>
+      </p:grpSpPr>
+      <p:sp>
+        <p:nvSpPr>
+          <p:cNvPr id="2" name="Slide Image Placeholder 1"/>
+          <p:cNvSpPr>
+            <a:spLocks noGrp="1" noRot="1" noChangeAspect="1"/>
+          </p:cNvSpPr>
+          <p:nvPr>
+            <p:ph type="sldImg"/>
+          </p:nvPr>
+        </p:nvSpPr>
+        <p:spPr/>
+      </p:sp>
+      <p:sp>
+        <p:nvSpPr>
+          <p:cNvPr id="3" name="Notes Placeholder 2"/>
+          <p:cNvSpPr>
+            <a:spLocks noGrp="1"/>
+          </p:cNvSpPr>
+          <p:nvPr>
+            <p:ph type="body" idx="1"/>
+          </p:nvPr>
+        </p:nvSpPr>
+        <p:spPr/>
+        <p:txBody>
+          <a:bodyPr/>
+          <a:lstStyle/>
+          <a:p>
+            <a:r>
+              <a:rPr lang="en-GB" dirty="0"/>
+              <a:t>Since the evaluation metric (loss function) is the total reward collected the authors compute it over training.</a:t>
+            </a:r>
+          </a:p>
+          <a:p>
+            <a:r>
+              <a:rPr lang="en-GB" dirty="0"/>
+              <a:t>However it doesn’t give the impression of learning progress because the signal is noisy. (because small, weight changes result in large changes to the game states visited)</a:t>
+            </a:r>
+          </a:p>
+          <a:p>
+            <a:endParaRPr lang="en-GB" dirty="0"/>
+          </a:p>
+          <a:p>
+            <a:r>
+              <a:rPr lang="en-GB" dirty="0"/>
+              <a:t>Q-Value is more stable metric (right), this is reward obtained from current state.</a:t>
+            </a:r>
+          </a:p>
+          <a:p>
+            <a:r>
+              <a:rPr lang="en-GB" dirty="0"/>
+              <a:t>The values for all 4 plots are averaged over a fixed set of states collected at the beginning training. The Q-Value is taken from each state by maximising over its actions.</a:t>
+            </a:r>
+          </a:p>
+          <a:p>
+            <a:endParaRPr lang="en-GB" dirty="0"/>
+          </a:p>
+          <a:p>
+            <a:r>
+              <a:rPr lang="en-GB" dirty="0"/>
+              <a:t>The smooth improvement to predicted Q-value shows the method is able to train large neural networks using an RL signal.</a:t>
+            </a:r>
+          </a:p>
+        </p:txBody>
+      </p:sp>
+      <p:sp>
+        <p:nvSpPr>
+          <p:cNvPr id="4" name="Slide Number Placeholder 3"/>
+          <p:cNvSpPr>
+            <a:spLocks noGrp="1"/>
+          </p:cNvSpPr>
+          <p:nvPr>
+            <p:ph type="sldNum" sz="quarter" idx="5"/>
+          </p:nvPr>
+        </p:nvSpPr>
+        <p:spPr/>
+        <p:txBody>
+          <a:bodyPr/>
+          <a:lstStyle/>
+          <a:p>
+            <a:fld id="{5EB41D8C-D68C-4D87-9D56-7F243B38E3DB}" type="slidenum">
+              <a:rPr lang="en-GB" smtClean="0"/>
+              <a:t>9</a:t>
+            </a:fld>
+            <a:endParaRPr lang="en-GB"/>
+          </a:p>
+        </p:txBody>
+      </p:sp>
+    </p:spTree>
+    <p:extLst>
+      <p:ext uri="{BB962C8B-B14F-4D97-AF65-F5344CB8AC3E}">
+        <p14:creationId xmlns:p14="http://schemas.microsoft.com/office/powerpoint/2010/main" val="649143961"/>
+      </p:ext>
+    </p:extLst>
+  </p:cSld>
+  <p:clrMapOvr>
+    <a:masterClrMapping/>
+  </p:clrMapOvr>
+</p:notes>
+</file>
+
+<file path=ppt/notesSlides/notesSlide8.xml><?xml version="1.0" encoding="utf-8"?>
+<p:notes xmlns:a="http://schemas.openxmlformats.org/drawingml/2006/main" xmlns:r="http://schemas.openxmlformats.org/officeDocument/2006/relationships" xmlns:p="http://schemas.openxmlformats.org/presentationml/2006/main">
+  <p:cSld>
+    <p:spTree>
+      <p:nvGrpSpPr>
+        <p:cNvPr id="1" name=""/>
+        <p:cNvGrpSpPr/>
+        <p:nvPr/>
+      </p:nvGrpSpPr>
+      <p:grpSpPr>
+        <a:xfrm>
+          <a:off x="0" y="0"/>
+          <a:ext cx="0" cy="0"/>
+          <a:chOff x="0" y="0"/>
+          <a:chExt cx="0" cy="0"/>
+        </a:xfrm>
+      </p:grpSpPr>
+      <p:sp>
+        <p:nvSpPr>
+          <p:cNvPr id="2" name="Slide Image Placeholder 1"/>
+          <p:cNvSpPr>
+            <a:spLocks noGrp="1" noRot="1" noChangeAspect="1"/>
+          </p:cNvSpPr>
+          <p:nvPr>
+            <p:ph type="sldImg"/>
+          </p:nvPr>
+        </p:nvSpPr>
+        <p:spPr/>
+      </p:sp>
+      <p:sp>
+        <p:nvSpPr>
+          <p:cNvPr id="3" name="Notes Placeholder 2"/>
+          <p:cNvSpPr>
+            <a:spLocks noGrp="1"/>
+          </p:cNvSpPr>
+          <p:nvPr>
+            <p:ph type="body" idx="1"/>
+          </p:nvPr>
+        </p:nvSpPr>
+        <p:spPr/>
+        <p:txBody>
+          <a:bodyPr/>
+          <a:lstStyle/>
+          <a:p>
+            <a:r>
+              <a:rPr lang="en-GB" dirty="0"/>
+              <a:t>For the learned methods we report average score obtained following an e-greed policy with e=0.05</a:t>
+            </a:r>
+          </a:p>
+          <a:p>
+            <a:r>
+              <a:rPr lang="en-GB" dirty="0"/>
+              <a:t>DQN is better despite no prior knowledge about the inputs/representations</a:t>
+            </a:r>
+          </a:p>
+          <a:p>
+            <a:endParaRPr lang="en-GB" dirty="0"/>
+          </a:p>
+          <a:p>
+            <a:endParaRPr lang="en-GB" dirty="0"/>
+          </a:p>
+          <a:p>
+            <a:r>
+              <a:rPr lang="en-GB" dirty="0"/>
+              <a:t>NHEAT HERE</a:t>
+            </a:r>
+          </a:p>
+          <a:p>
+            <a:endParaRPr lang="en-GB" dirty="0"/>
+          </a:p>
+          <a:p>
+            <a:r>
+              <a:rPr lang="en-GB" dirty="0"/>
+              <a:t>Better than human expert on Breakout, </a:t>
+            </a:r>
+            <a:r>
+              <a:rPr lang="en-GB" dirty="0" err="1"/>
+              <a:t>Enduro</a:t>
+            </a:r>
+            <a:r>
+              <a:rPr lang="en-GB" dirty="0"/>
+              <a:t>, Pong and close on Beam Rider</a:t>
+            </a:r>
+          </a:p>
+          <a:p>
+            <a:r>
+              <a:rPr lang="en-GB" dirty="0"/>
+              <a:t>Far from human performance on Q*</a:t>
+            </a:r>
+            <a:r>
+              <a:rPr lang="en-GB" dirty="0" err="1"/>
+              <a:t>bert</a:t>
+            </a:r>
+            <a:r>
+              <a:rPr lang="en-GB" dirty="0"/>
+              <a:t>, Seaquest and Space Invaders.</a:t>
+            </a:r>
+          </a:p>
+        </p:txBody>
+      </p:sp>
+      <p:sp>
+        <p:nvSpPr>
+          <p:cNvPr id="4" name="Slide Number Placeholder 3"/>
+          <p:cNvSpPr>
+            <a:spLocks noGrp="1"/>
+          </p:cNvSpPr>
+          <p:nvPr>
+            <p:ph type="sldNum" sz="quarter" idx="5"/>
+          </p:nvPr>
+        </p:nvSpPr>
+        <p:spPr/>
+        <p:txBody>
+          <a:bodyPr/>
+          <a:lstStyle/>
+          <a:p>
+            <a:fld id="{5EB41D8C-D68C-4D87-9D56-7F243B38E3DB}" type="slidenum">
+              <a:rPr lang="en-GB" smtClean="0"/>
+              <a:t>10</a:t>
+            </a:fld>
+            <a:endParaRPr lang="en-GB"/>
+          </a:p>
+        </p:txBody>
+      </p:sp>
+    </p:spTree>
+    <p:extLst>
+      <p:ext uri="{BB962C8B-B14F-4D97-AF65-F5344CB8AC3E}">
+        <p14:creationId xmlns:p14="http://schemas.microsoft.com/office/powerpoint/2010/main" val="3056309025"/>
+      </p:ext>
+    </p:extLst>
+  </p:cSld>
+  <p:clrMapOvr>
+    <a:masterClrMapping/>
+  </p:clrMapOvr>
+</p:notes>
+</file>
+
+<file path=ppt/notesSlides/notesSlide9.xml><?xml version="1.0" encoding="utf-8"?>
+<p:notes xmlns:a="http://schemas.openxmlformats.org/drawingml/2006/main" xmlns:r="http://schemas.openxmlformats.org/officeDocument/2006/relationships" xmlns:p="http://schemas.openxmlformats.org/presentationml/2006/main">
+  <p:cSld>
+    <p:spTree>
+      <p:nvGrpSpPr>
+        <p:cNvPr id="1" name=""/>
+        <p:cNvGrpSpPr/>
+        <p:nvPr/>
+      </p:nvGrpSpPr>
+      <p:grpSpPr>
+        <a:xfrm>
+          <a:off x="0" y="0"/>
+          <a:ext cx="0" cy="0"/>
+          <a:chOff x="0" y="0"/>
+          <a:chExt cx="0" cy="0"/>
+        </a:xfrm>
+      </p:grpSpPr>
+      <p:sp>
+        <p:nvSpPr>
+          <p:cNvPr id="2" name="Slide Image Placeholder 1"/>
+          <p:cNvSpPr>
+            <a:spLocks noGrp="1" noRot="1" noChangeAspect="1"/>
+          </p:cNvSpPr>
+          <p:nvPr>
+            <p:ph type="sldImg"/>
+          </p:nvPr>
+        </p:nvSpPr>
+        <p:spPr/>
+      </p:sp>
+      <p:sp>
+        <p:nvSpPr>
+          <p:cNvPr id="3" name="Notes Placeholder 2"/>
+          <p:cNvSpPr>
+            <a:spLocks noGrp="1"/>
+          </p:cNvSpPr>
+          <p:nvPr>
+            <p:ph type="body" idx="1"/>
+          </p:nvPr>
+        </p:nvSpPr>
+        <p:spPr/>
+        <p:txBody>
+          <a:bodyPr/>
+          <a:lstStyle/>
+          <a:p>
+            <a:endParaRPr lang="en-GB" dirty="0"/>
+          </a:p>
+        </p:txBody>
+      </p:sp>
+      <p:sp>
+        <p:nvSpPr>
+          <p:cNvPr id="4" name="Slide Number Placeholder 3"/>
+          <p:cNvSpPr>
+            <a:spLocks noGrp="1"/>
+          </p:cNvSpPr>
+          <p:nvPr>
+            <p:ph type="sldNum" sz="quarter" idx="5"/>
+          </p:nvPr>
+        </p:nvSpPr>
+        <p:spPr/>
+        <p:txBody>
+          <a:bodyPr/>
+          <a:lstStyle/>
+          <a:p>
+            <a:fld id="{5EB41D8C-D68C-4D87-9D56-7F243B38E3DB}" type="slidenum">
+              <a:rPr lang="en-GB" smtClean="0"/>
+              <a:t>11</a:t>
+            </a:fld>
+            <a:endParaRPr lang="en-GB"/>
+          </a:p>
+        </p:txBody>
+      </p:sp>
+    </p:spTree>
+    <p:extLst>
+      <p:ext uri="{BB962C8B-B14F-4D97-AF65-F5344CB8AC3E}">
+        <p14:creationId xmlns:p14="http://schemas.microsoft.com/office/powerpoint/2010/main" val="2882513350"/>
       </p:ext>
     </p:extLst>
   </p:cSld>
@@ -1360,7 +1714,7 @@
           <a:p>
             <a:fld id="{A3ACD417-9FA5-4093-9E64-8EEA39F65FF1}" type="datetimeFigureOut">
               <a:rPr lang="en-GB" smtClean="0"/>
-              <a:t>20/03/2020</a:t>
+              <a:t>22/03/2020</a:t>
             </a:fld>
             <a:endParaRPr lang="en-GB"/>
           </a:p>
@@ -1560,7 +1914,7 @@
           <a:p>
             <a:fld id="{A3ACD417-9FA5-4093-9E64-8EEA39F65FF1}" type="datetimeFigureOut">
               <a:rPr lang="en-GB" smtClean="0"/>
-              <a:t>20/03/2020</a:t>
+              <a:t>22/03/2020</a:t>
             </a:fld>
             <a:endParaRPr lang="en-GB"/>
           </a:p>
@@ -1770,7 +2124,7 @@
           <a:p>
             <a:fld id="{A3ACD417-9FA5-4093-9E64-8EEA39F65FF1}" type="datetimeFigureOut">
               <a:rPr lang="en-GB" smtClean="0"/>
-              <a:t>20/03/2020</a:t>
+              <a:t>22/03/2020</a:t>
             </a:fld>
             <a:endParaRPr lang="en-GB"/>
           </a:p>
@@ -1970,7 +2324,7 @@
           <a:p>
             <a:fld id="{A3ACD417-9FA5-4093-9E64-8EEA39F65FF1}" type="datetimeFigureOut">
               <a:rPr lang="en-GB" smtClean="0"/>
-              <a:t>20/03/2020</a:t>
+              <a:t>22/03/2020</a:t>
             </a:fld>
             <a:endParaRPr lang="en-GB"/>
           </a:p>
@@ -2246,7 +2600,7 @@
           <a:p>
             <a:fld id="{A3ACD417-9FA5-4093-9E64-8EEA39F65FF1}" type="datetimeFigureOut">
               <a:rPr lang="en-GB" smtClean="0"/>
-              <a:t>20/03/2020</a:t>
+              <a:t>22/03/2020</a:t>
             </a:fld>
             <a:endParaRPr lang="en-GB"/>
           </a:p>
@@ -2514,7 +2868,7 @@
           <a:p>
             <a:fld id="{A3ACD417-9FA5-4093-9E64-8EEA39F65FF1}" type="datetimeFigureOut">
               <a:rPr lang="en-GB" smtClean="0"/>
-              <a:t>20/03/2020</a:t>
+              <a:t>22/03/2020</a:t>
             </a:fld>
             <a:endParaRPr lang="en-GB"/>
           </a:p>
@@ -2929,7 +3283,7 @@
           <a:p>
             <a:fld id="{A3ACD417-9FA5-4093-9E64-8EEA39F65FF1}" type="datetimeFigureOut">
               <a:rPr lang="en-GB" smtClean="0"/>
-              <a:t>20/03/2020</a:t>
+              <a:t>22/03/2020</a:t>
             </a:fld>
             <a:endParaRPr lang="en-GB"/>
           </a:p>
@@ -3071,7 +3425,7 @@
           <a:p>
             <a:fld id="{A3ACD417-9FA5-4093-9E64-8EEA39F65FF1}" type="datetimeFigureOut">
               <a:rPr lang="en-GB" smtClean="0"/>
-              <a:t>20/03/2020</a:t>
+              <a:t>22/03/2020</a:t>
             </a:fld>
             <a:endParaRPr lang="en-GB"/>
           </a:p>
@@ -3184,7 +3538,7 @@
           <a:p>
             <a:fld id="{A3ACD417-9FA5-4093-9E64-8EEA39F65FF1}" type="datetimeFigureOut">
               <a:rPr lang="en-GB" smtClean="0"/>
-              <a:t>20/03/2020</a:t>
+              <a:t>22/03/2020</a:t>
             </a:fld>
             <a:endParaRPr lang="en-GB"/>
           </a:p>
@@ -3497,7 +3851,7 @@
           <a:p>
             <a:fld id="{A3ACD417-9FA5-4093-9E64-8EEA39F65FF1}" type="datetimeFigureOut">
               <a:rPr lang="en-GB" smtClean="0"/>
-              <a:t>20/03/2020</a:t>
+              <a:t>22/03/2020</a:t>
             </a:fld>
             <a:endParaRPr lang="en-GB"/>
           </a:p>
@@ -3786,7 +4140,7 @@
           <a:p>
             <a:fld id="{A3ACD417-9FA5-4093-9E64-8EEA39F65FF1}" type="datetimeFigureOut">
               <a:rPr lang="en-GB" smtClean="0"/>
-              <a:t>20/03/2020</a:t>
+              <a:t>22/03/2020</a:t>
             </a:fld>
             <a:endParaRPr lang="en-GB"/>
           </a:p>
@@ -4055,7 +4409,7 @@
           <a:p>
             <a:fld id="{A3ACD417-9FA5-4093-9E64-8EEA39F65FF1}" type="datetimeFigureOut">
               <a:rPr lang="en-GB" smtClean="0"/>
-              <a:t>20/03/2020</a:t>
+              <a:t>22/03/2020</a:t>
             </a:fld>
             <a:endParaRPr lang="en-GB"/>
           </a:p>
@@ -4646,6 +5000,318 @@
     <p:extLst>
       <p:ext uri="{BB962C8B-B14F-4D97-AF65-F5344CB8AC3E}">
         <p14:creationId xmlns:p14="http://schemas.microsoft.com/office/powerpoint/2010/main" val="2470099225"/>
+      </p:ext>
+    </p:extLst>
+  </p:cSld>
+  <p:clrMapOvr>
+    <a:masterClrMapping/>
+  </p:clrMapOvr>
+</p:sld>
+</file>
+
+<file path=ppt/slides/slide10.xml><?xml version="1.0" encoding="utf-8"?>
+<p:sld xmlns:a="http://schemas.openxmlformats.org/drawingml/2006/main" xmlns:r="http://schemas.openxmlformats.org/officeDocument/2006/relationships" xmlns:p="http://schemas.openxmlformats.org/presentationml/2006/main">
+  <p:cSld>
+    <p:spTree>
+      <p:nvGrpSpPr>
+        <p:cNvPr id="1" name=""/>
+        <p:cNvGrpSpPr/>
+        <p:nvPr/>
+      </p:nvGrpSpPr>
+      <p:grpSpPr>
+        <a:xfrm>
+          <a:off x="0" y="0"/>
+          <a:ext cx="0" cy="0"/>
+          <a:chOff x="0" y="0"/>
+          <a:chExt cx="0" cy="0"/>
+        </a:xfrm>
+      </p:grpSpPr>
+      <p:sp>
+        <p:nvSpPr>
+          <p:cNvPr id="2" name="Title 1">
+            <a:extLst>
+              <a:ext uri="{FF2B5EF4-FFF2-40B4-BE49-F238E27FC236}">
+                <a16:creationId xmlns:a16="http://schemas.microsoft.com/office/drawing/2014/main" id="{281EAB0D-56CB-453E-9B99-068794DC9B07}"/>
+              </a:ext>
+            </a:extLst>
+          </p:cNvPr>
+          <p:cNvSpPr>
+            <a:spLocks noGrp="1"/>
+          </p:cNvSpPr>
+          <p:nvPr>
+            <p:ph type="title"/>
+          </p:nvPr>
+        </p:nvSpPr>
+        <p:spPr>
+          <a:xfrm>
+            <a:off x="838199" y="365125"/>
+            <a:ext cx="4983051" cy="819731"/>
+          </a:xfrm>
+        </p:spPr>
+        <p:txBody>
+          <a:bodyPr>
+            <a:normAutofit fontScale="90000"/>
+          </a:bodyPr>
+          <a:lstStyle/>
+          <a:p>
+            <a:r>
+              <a:rPr lang="en-GB" dirty="0">
+                <a:ln w="0"/>
+                <a:effectLst>
+                  <a:outerShdw blurRad="38100" dist="19050" dir="2700000" algn="tl" rotWithShape="0">
+                    <a:schemeClr val="dk1">
+                      <a:alpha val="40000"/>
+                    </a:schemeClr>
+                  </a:outerShdw>
+                </a:effectLst>
+              </a:rPr>
+              <a:t>Experiments &amp; Results</a:t>
+            </a:r>
+          </a:p>
+        </p:txBody>
+      </p:sp>
+      <p:pic>
+        <p:nvPicPr>
+          <p:cNvPr id="14" name="Picture 13">
+            <a:extLst>
+              <a:ext uri="{FF2B5EF4-FFF2-40B4-BE49-F238E27FC236}">
+                <a16:creationId xmlns:a16="http://schemas.microsoft.com/office/drawing/2014/main" id="{E26990C6-A05A-4F58-8281-D4165BF0E360}"/>
+              </a:ext>
+            </a:extLst>
+          </p:cNvPr>
+          <p:cNvPicPr>
+            <a:picLocks noChangeAspect="1"/>
+          </p:cNvPicPr>
+          <p:nvPr/>
+        </p:nvPicPr>
+        <p:blipFill>
+          <a:blip r:embed="rId4">
+            <a:clrChange>
+              <a:clrFrom>
+                <a:srgbClr val="FFFFFF"/>
+              </a:clrFrom>
+              <a:clrTo>
+                <a:srgbClr val="FFFFFF">
+                  <a:alpha val="0"/>
+                </a:srgbClr>
+              </a:clrTo>
+            </a:clrChange>
+            <a:extLst>
+              <a:ext uri="{28A0092B-C50C-407E-A947-70E740481C1C}">
+                <a14:useLocalDpi xmlns:a14="http://schemas.microsoft.com/office/drawing/2010/main" val="0"/>
+              </a:ext>
+            </a:extLst>
+          </a:blip>
+          <a:stretch>
+            <a:fillRect/>
+          </a:stretch>
+        </p:blipFill>
+        <p:spPr>
+          <a:xfrm>
+            <a:off x="280763" y="1843605"/>
+            <a:ext cx="11630474" cy="3514458"/>
+          </a:xfrm>
+          <a:prstGeom prst="rect">
+            <a:avLst/>
+          </a:prstGeom>
+        </p:spPr>
+      </p:pic>
+    </p:spTree>
+    <p:custDataLst>
+      <p:tags r:id="rId1"/>
+    </p:custDataLst>
+    <p:extLst>
+      <p:ext uri="{BB962C8B-B14F-4D97-AF65-F5344CB8AC3E}">
+        <p14:creationId xmlns:p14="http://schemas.microsoft.com/office/powerpoint/2010/main" val="508954462"/>
+      </p:ext>
+    </p:extLst>
+  </p:cSld>
+  <p:clrMapOvr>
+    <a:masterClrMapping/>
+  </p:clrMapOvr>
+</p:sld>
+</file>
+
+<file path=ppt/slides/slide11.xml><?xml version="1.0" encoding="utf-8"?>
+<p:sld xmlns:a="http://schemas.openxmlformats.org/drawingml/2006/main" xmlns:r="http://schemas.openxmlformats.org/officeDocument/2006/relationships" xmlns:p="http://schemas.openxmlformats.org/presentationml/2006/main">
+  <p:cSld>
+    <p:spTree>
+      <p:nvGrpSpPr>
+        <p:cNvPr id="1" name=""/>
+        <p:cNvGrpSpPr/>
+        <p:nvPr/>
+      </p:nvGrpSpPr>
+      <p:grpSpPr>
+        <a:xfrm>
+          <a:off x="0" y="0"/>
+          <a:ext cx="0" cy="0"/>
+          <a:chOff x="0" y="0"/>
+          <a:chExt cx="0" cy="0"/>
+        </a:xfrm>
+      </p:grpSpPr>
+      <p:sp>
+        <p:nvSpPr>
+          <p:cNvPr id="4" name="Title 1">
+            <a:extLst>
+              <a:ext uri="{FF2B5EF4-FFF2-40B4-BE49-F238E27FC236}">
+                <a16:creationId xmlns:a16="http://schemas.microsoft.com/office/drawing/2014/main" id="{F7622F16-DA8F-4FF6-B7A1-55AB8BD5D5AB}"/>
+              </a:ext>
+            </a:extLst>
+          </p:cNvPr>
+          <p:cNvSpPr>
+            <a:spLocks noGrp="1"/>
+          </p:cNvSpPr>
+          <p:nvPr>
+            <p:ph type="title"/>
+          </p:nvPr>
+        </p:nvSpPr>
+        <p:spPr>
+          <a:xfrm>
+            <a:off x="661737" y="509504"/>
+            <a:ext cx="2707106" cy="934285"/>
+          </a:xfrm>
+        </p:spPr>
+        <p:txBody>
+          <a:bodyPr>
+            <a:normAutofit/>
+          </a:bodyPr>
+          <a:lstStyle/>
+          <a:p>
+            <a:r>
+              <a:rPr lang="en-GB" dirty="0">
+                <a:ln w="0"/>
+                <a:effectLst>
+                  <a:outerShdw blurRad="38100" dist="19050" dir="2700000" algn="tl" rotWithShape="0">
+                    <a:schemeClr val="dk1">
+                      <a:alpha val="40000"/>
+                    </a:schemeClr>
+                  </a:outerShdw>
+                </a:effectLst>
+              </a:rPr>
+              <a:t>Summary </a:t>
+            </a:r>
+          </a:p>
+        </p:txBody>
+      </p:sp>
+      <p:sp>
+        <p:nvSpPr>
+          <p:cNvPr id="5" name="TextBox 4">
+            <a:extLst>
+              <a:ext uri="{FF2B5EF4-FFF2-40B4-BE49-F238E27FC236}">
+                <a16:creationId xmlns:a16="http://schemas.microsoft.com/office/drawing/2014/main" id="{1626E077-1492-45F7-BE20-7C94354A66EE}"/>
+              </a:ext>
+            </a:extLst>
+          </p:cNvPr>
+          <p:cNvSpPr txBox="1"/>
+          <p:nvPr/>
+        </p:nvSpPr>
+        <p:spPr>
+          <a:xfrm>
+            <a:off x="1171074" y="1443789"/>
+            <a:ext cx="6545179" cy="830997"/>
+          </a:xfrm>
+          <a:prstGeom prst="rect">
+            <a:avLst/>
+          </a:prstGeom>
+          <a:noFill/>
+        </p:spPr>
+        <p:txBody>
+          <a:bodyPr wrap="square" rtlCol="0">
+            <a:spAutoFit/>
+          </a:bodyPr>
+          <a:lstStyle/>
+          <a:p>
+            <a:pPr marL="285750" indent="-285750">
+              <a:buFont typeface="Arial" panose="020B0604020202020204" pitchFamily="34" charset="0"/>
+              <a:buChar char="•"/>
+            </a:pPr>
+            <a:r>
+              <a:rPr lang="en-GB" sz="2400" dirty="0"/>
+              <a:t>The start of Deep Reinforcement Learning</a:t>
+            </a:r>
+          </a:p>
+          <a:p>
+            <a:pPr marL="285750" indent="-285750">
+              <a:buFont typeface="Arial" panose="020B0604020202020204" pitchFamily="34" charset="0"/>
+              <a:buChar char="•"/>
+            </a:pPr>
+            <a:r>
+              <a:rPr lang="en-GB" sz="2400" dirty="0"/>
+              <a:t>State-of-the-art at playing 6 Atari Games</a:t>
+            </a:r>
+          </a:p>
+        </p:txBody>
+      </p:sp>
+      <p:sp>
+        <p:nvSpPr>
+          <p:cNvPr id="6" name="Title 1">
+            <a:extLst>
+              <a:ext uri="{FF2B5EF4-FFF2-40B4-BE49-F238E27FC236}">
+                <a16:creationId xmlns:a16="http://schemas.microsoft.com/office/drawing/2014/main" id="{8C591B93-EB69-494C-8DF0-47964B049512}"/>
+              </a:ext>
+            </a:extLst>
+          </p:cNvPr>
+          <p:cNvSpPr txBox="1">
+            <a:spLocks/>
+          </p:cNvSpPr>
+          <p:nvPr/>
+        </p:nvSpPr>
+        <p:spPr>
+          <a:xfrm>
+            <a:off x="661736" y="2378074"/>
+            <a:ext cx="3348789" cy="934285"/>
+          </a:xfrm>
+          <a:prstGeom prst="rect">
+            <a:avLst/>
+          </a:prstGeom>
+        </p:spPr>
+        <p:txBody>
+          <a:bodyPr vert="horz" lIns="91440" tIns="45720" rIns="91440" bIns="45720" rtlCol="0" anchor="ctr">
+            <a:normAutofit fontScale="92500"/>
+          </a:bodyPr>
+          <a:lstStyle>
+            <a:lvl1pPr algn="l" defTabSz="914400" rtl="0" eaLnBrk="1" latinLnBrk="0" hangingPunct="1">
+              <a:lnSpc>
+                <a:spcPct val="90000"/>
+              </a:lnSpc>
+              <a:spcBef>
+                <a:spcPct val="0"/>
+              </a:spcBef>
+              <a:buNone/>
+              <a:defRPr sz="4400" kern="1200">
+                <a:solidFill>
+                  <a:schemeClr val="tx1"/>
+                </a:solidFill>
+                <a:latin typeface="+mj-lt"/>
+                <a:ea typeface="+mj-ea"/>
+                <a:cs typeface="+mj-cs"/>
+              </a:defRPr>
+            </a:lvl1pPr>
+          </a:lstStyle>
+          <a:p>
+            <a:r>
+              <a:rPr lang="en-GB" dirty="0">
+                <a:ln w="0"/>
+                <a:effectLst>
+                  <a:outerShdw blurRad="38100" dist="19050" dir="2700000" algn="tl" rotWithShape="0">
+                    <a:schemeClr val="dk1">
+                      <a:alpha val="40000"/>
+                    </a:schemeClr>
+                  </a:outerShdw>
+                </a:effectLst>
+              </a:rPr>
+              <a:t>Resulting Work</a:t>
+            </a:r>
+          </a:p>
+        </p:txBody>
+      </p:sp>
+    </p:spTree>
+    <p:custDataLst>
+      <p:tags r:id="rId1"/>
+    </p:custDataLst>
+    <p:extLst>
+      <p:ext uri="{BB962C8B-B14F-4D97-AF65-F5344CB8AC3E}">
+        <p14:creationId xmlns:p14="http://schemas.microsoft.com/office/powerpoint/2010/main" val="2643528183"/>
       </p:ext>
     </p:extLst>
   </p:cSld>
@@ -5451,15 +6117,7 @@
             <a:p>
               <a:r>
                 <a:rPr lang="en-GB" b="1" dirty="0"/>
-                <a:t>Five Atari Games: Pong, Breakout, Space Invaders, </a:t>
-              </a:r>
-              <a:r>
-                <a:rPr lang="en-GB" b="1" dirty="0" err="1"/>
-                <a:t>Seaquest</a:t>
-              </a:r>
-              <a:r>
-                <a:rPr lang="en-GB" b="1" dirty="0"/>
-                <a:t>, Beam Rider</a:t>
+                <a:t>Five Atari Games: Pong, Breakout, Space Invaders, Seaquest, Beam Rider</a:t>
               </a:r>
             </a:p>
           </p:txBody>
@@ -5968,6 +6626,41 @@
           </a:fontRef>
         </p:style>
       </p:cxnSp>
+      <p:sp>
+        <p:nvSpPr>
+          <p:cNvPr id="9" name="TextBox 8">
+            <a:extLst>
+              <a:ext uri="{FF2B5EF4-FFF2-40B4-BE49-F238E27FC236}">
+                <a16:creationId xmlns:a16="http://schemas.microsoft.com/office/drawing/2014/main" id="{F0BB1E18-F431-4D5C-A77D-B450A4023FBD}"/>
+              </a:ext>
+            </a:extLst>
+          </p:cNvPr>
+          <p:cNvSpPr txBox="1"/>
+          <p:nvPr/>
+        </p:nvSpPr>
+        <p:spPr>
+          <a:xfrm>
+            <a:off x="8137802" y="5960658"/>
+            <a:ext cx="4042441" cy="523220"/>
+          </a:xfrm>
+          <a:prstGeom prst="rect">
+            <a:avLst/>
+          </a:prstGeom>
+          <a:noFill/>
+        </p:spPr>
+        <p:txBody>
+          <a:bodyPr wrap="square" rtlCol="0">
+            <a:spAutoFit/>
+          </a:bodyPr>
+          <a:lstStyle/>
+          <a:p>
+            <a:r>
+              <a:rPr lang="en-GB" sz="2800" b="1" dirty="0"/>
+              <a:t>Model-free &amp; Off Policy</a:t>
+            </a:r>
+          </a:p>
+        </p:txBody>
+      </p:sp>
     </p:spTree>
     <p:custDataLst>
       <p:tags r:id="rId1"/>
@@ -6086,8 +6779,8 @@
           </a:ln>
         </p:spPr>
       </p:pic>
-      <mc:AlternateContent xmlns:mc="http://schemas.openxmlformats.org/markup-compatibility/2006">
-        <mc:Choice xmlns:a14="http://schemas.microsoft.com/office/drawing/2010/main" Requires="a14">
+      <mc:AlternateContent xmlns:mc="http://schemas.openxmlformats.org/markup-compatibility/2006" xmlns:a14="http://schemas.microsoft.com/office/drawing/2010/main">
+        <mc:Choice Requires="a14">
           <p:sp>
             <p:nvSpPr>
               <p:cNvPr id="3" name="TextBox 2">
@@ -6372,7 +7065,7 @@
             </p:txBody>
           </p:sp>
         </mc:Choice>
-        <mc:Fallback>
+        <mc:Fallback xmlns="">
           <p:sp>
             <p:nvSpPr>
               <p:cNvPr id="3" name="TextBox 2">
@@ -6466,7 +7159,12 @@
             <p:ph type="title"/>
           </p:nvPr>
         </p:nvSpPr>
-        <p:spPr/>
+        <p:spPr>
+          <a:xfrm>
+            <a:off x="1673094" y="506792"/>
+            <a:ext cx="8562474" cy="1325563"/>
+          </a:xfrm>
+        </p:spPr>
         <p:txBody>
           <a:bodyPr/>
           <a:lstStyle/>
@@ -6474,6 +7172,75 @@
             <a:r>
               <a:rPr lang="en-GB" dirty="0"/>
               <a:t>Pre-processing &amp; Model Architecture</a:t>
+            </a:r>
+          </a:p>
+        </p:txBody>
+      </p:sp>
+      <p:sp>
+        <p:nvSpPr>
+          <p:cNvPr id="3" name="TextBox 2">
+            <a:extLst>
+              <a:ext uri="{FF2B5EF4-FFF2-40B4-BE49-F238E27FC236}">
+                <a16:creationId xmlns:a16="http://schemas.microsoft.com/office/drawing/2014/main" id="{9B80D7E1-ABEC-4FBC-84D6-327B354E9866}"/>
+              </a:ext>
+            </a:extLst>
+          </p:cNvPr>
+          <p:cNvSpPr txBox="1"/>
+          <p:nvPr/>
+        </p:nvSpPr>
+        <p:spPr>
+          <a:xfrm>
+            <a:off x="6096000" y="2055184"/>
+            <a:ext cx="6096000" cy="1569660"/>
+          </a:xfrm>
+          <a:prstGeom prst="rect">
+            <a:avLst/>
+          </a:prstGeom>
+          <a:noFill/>
+        </p:spPr>
+        <p:txBody>
+          <a:bodyPr wrap="square" rtlCol="0">
+            <a:spAutoFit/>
+          </a:bodyPr>
+          <a:lstStyle/>
+          <a:p>
+            <a:pPr marL="285750" indent="-285750">
+              <a:buFont typeface="Arial" panose="020B0604020202020204" pitchFamily="34" charset="0"/>
+              <a:buChar char="•"/>
+            </a:pPr>
+            <a:r>
+              <a:rPr lang="en-GB" sz="2400" dirty="0"/>
+              <a:t>Pre-Processing</a:t>
+            </a:r>
+          </a:p>
+          <a:p>
+            <a:pPr marL="742950" lvl="1" indent="-285750">
+              <a:buFont typeface="Arial" panose="020B0604020202020204" pitchFamily="34" charset="0"/>
+              <a:buChar char="•"/>
+            </a:pPr>
+            <a:r>
+              <a:rPr lang="en-GB" sz="2400" dirty="0"/>
+              <a:t>RGB -&gt; Grey-Scale</a:t>
+            </a:r>
+          </a:p>
+          <a:p>
+            <a:pPr marL="742950" lvl="1" indent="-285750">
+              <a:buFont typeface="Arial" panose="020B0604020202020204" pitchFamily="34" charset="0"/>
+              <a:buChar char="•"/>
+            </a:pPr>
+            <a:r>
+              <a:rPr lang="en-GB" sz="2400" dirty="0"/>
+              <a:t>210x160 is Down-Sampled to 110x84</a:t>
+            </a:r>
+          </a:p>
+          <a:p>
+            <a:pPr marL="742950" lvl="1" indent="-285750">
+              <a:buFont typeface="Arial" panose="020B0604020202020204" pitchFamily="34" charset="0"/>
+              <a:buChar char="•"/>
+            </a:pPr>
+            <a:r>
+              <a:rPr lang="en-GB" sz="2400" dirty="0"/>
+              <a:t>84x84 cropped region</a:t>
             </a:r>
           </a:p>
         </p:txBody>
@@ -6482,28 +7249,27 @@
         <mc:Choice xmlns:a14="http://schemas.microsoft.com/office/drawing/2010/main" Requires="a14">
           <p:sp>
             <p:nvSpPr>
-              <p:cNvPr id="3" name="TextBox 2">
+              <p:cNvPr id="4" name="Rectangle 3">
                 <a:extLst>
                   <a:ext uri="{FF2B5EF4-FFF2-40B4-BE49-F238E27FC236}">
-                    <a16:creationId xmlns:a16="http://schemas.microsoft.com/office/drawing/2014/main" id="{9B80D7E1-ABEC-4FBC-84D6-327B354E9866}"/>
+                    <a16:creationId xmlns:a16="http://schemas.microsoft.com/office/drawing/2014/main" id="{6167CD22-3173-44BF-A8DF-31B78D9EDD93}"/>
                   </a:ext>
                 </a:extLst>
               </p:cNvPr>
-              <p:cNvSpPr txBox="1"/>
+              <p:cNvSpPr/>
               <p:nvPr/>
             </p:nvSpPr>
             <p:spPr>
               <a:xfrm>
-                <a:off x="1056067" y="1690688"/>
-                <a:ext cx="8229601" cy="3139321"/>
+                <a:off x="770021" y="4017986"/>
+                <a:ext cx="11181347" cy="2308324"/>
               </a:xfrm>
               <a:prstGeom prst="rect">
                 <a:avLst/>
               </a:prstGeom>
-              <a:noFill/>
             </p:spPr>
             <p:txBody>
-              <a:bodyPr wrap="square" rtlCol="0">
+              <a:bodyPr wrap="square">
                 <a:spAutoFit/>
               </a:bodyPr>
               <a:lstStyle/>
@@ -6513,47 +7279,7 @@
                   <a:buChar char="•"/>
                 </a:pPr>
                 <a:r>
-                  <a:rPr lang="en-GB" dirty="0"/>
-                  <a:t>Pre-Processing</a:t>
-                </a:r>
-              </a:p>
-              <a:p>
-                <a:pPr marL="742950" lvl="1" indent="-285750">
-                  <a:buFont typeface="Arial" panose="020B0604020202020204" pitchFamily="34" charset="0"/>
-                  <a:buChar char="•"/>
-                </a:pPr>
-                <a:r>
-                  <a:rPr lang="en-GB" dirty="0"/>
-                  <a:t>RGB -&gt; Grey-Scale</a:t>
-                </a:r>
-              </a:p>
-              <a:p>
-                <a:pPr marL="742950" lvl="1" indent="-285750">
-                  <a:buFont typeface="Arial" panose="020B0604020202020204" pitchFamily="34" charset="0"/>
-                  <a:buChar char="•"/>
-                </a:pPr>
-                <a:r>
-                  <a:rPr lang="en-GB" dirty="0"/>
-                  <a:t>210x160 is Down-Sampled to 110x84</a:t>
-                </a:r>
-              </a:p>
-              <a:p>
-                <a:pPr marL="742950" lvl="1" indent="-285750">
-                  <a:buFont typeface="Arial" panose="020B0604020202020204" pitchFamily="34" charset="0"/>
-                  <a:buChar char="•"/>
-                </a:pPr>
-                <a:r>
-                  <a:rPr lang="en-GB" dirty="0"/>
-                  <a:t>84x84 cropped region</a:t>
-                </a:r>
-              </a:p>
-              <a:p>
-                <a:pPr marL="285750" indent="-285750">
-                  <a:buFont typeface="Arial" panose="020B0604020202020204" pitchFamily="34" charset="0"/>
-                  <a:buChar char="•"/>
-                </a:pPr>
-                <a:r>
-                  <a:rPr lang="en-GB" dirty="0">
+                  <a:rPr lang="en-GB" sz="2400" dirty="0">
                     <a:ea typeface="Cambria Math" panose="02040503050406030204" pitchFamily="18" charset="0"/>
                   </a:rPr>
                   <a:t>Function </a:t>
@@ -6561,28 +7287,28 @@
                 <a14:m>
                   <m:oMath xmlns:m="http://schemas.openxmlformats.org/officeDocument/2006/math">
                     <m:r>
-                      <a:rPr lang="en-GB" i="1" smtClean="0">
+                      <a:rPr lang="en-GB" sz="2400" i="1">
                         <a:latin typeface="Cambria Math" panose="02040503050406030204" pitchFamily="18" charset="0"/>
                         <a:ea typeface="Cambria Math" panose="02040503050406030204" pitchFamily="18" charset="0"/>
                       </a:rPr>
                       <m:t>𝜙</m:t>
                     </m:r>
                     <m:r>
-                      <a:rPr lang="en-GB" b="0" i="1" smtClean="0">
+                      <a:rPr lang="en-GB" sz="2400" i="1">
                         <a:latin typeface="Cambria Math" panose="02040503050406030204" pitchFamily="18" charset="0"/>
                         <a:ea typeface="Cambria Math" panose="02040503050406030204" pitchFamily="18" charset="0"/>
                       </a:rPr>
                       <m:t>(</m:t>
                     </m:r>
                     <m:r>
-                      <a:rPr lang="en-GB" b="0" i="1" smtClean="0">
+                      <a:rPr lang="en-GB" sz="2400" i="1">
                         <a:latin typeface="Cambria Math" panose="02040503050406030204" pitchFamily="18" charset="0"/>
                         <a:ea typeface="Cambria Math" panose="02040503050406030204" pitchFamily="18" charset="0"/>
                       </a:rPr>
                       <m:t>𝑠</m:t>
                     </m:r>
                     <m:r>
-                      <a:rPr lang="en-GB" b="0" i="1" smtClean="0">
+                      <a:rPr lang="en-GB" sz="2400" i="1">
                         <a:latin typeface="Cambria Math" panose="02040503050406030204" pitchFamily="18" charset="0"/>
                         <a:ea typeface="Cambria Math" panose="02040503050406030204" pitchFamily="18" charset="0"/>
                       </a:rPr>
@@ -6591,7 +7317,7 @@
                   </m:oMath>
                 </a14:m>
                 <a:r>
-                  <a:rPr lang="en-GB" dirty="0"/>
+                  <a:rPr lang="en-GB" sz="2400" dirty="0"/>
                   <a:t> stacks 4 processed histories for input to the Q-network (84 x 84 x 4)</a:t>
                 </a:r>
               </a:p>
@@ -6601,48 +7327,8 @@
                   <a:buChar char="•"/>
                 </a:pPr>
                 <a:r>
-                  <a:rPr lang="en-GB" dirty="0"/>
-                  <a:t>Network outputs predicted Q-Values for each action </a:t>
-                </a:r>
-                <a14:m>
-                  <m:oMath xmlns:m="http://schemas.openxmlformats.org/officeDocument/2006/math">
-                    <m:d>
-                      <m:dPr>
-                        <m:begChr m:val="|"/>
-                        <m:endChr m:val="|"/>
-                        <m:ctrlPr>
-                          <a:rPr lang="en-GB" b="0" i="1" smtClean="0">
-                            <a:latin typeface="Cambria Math" panose="02040503050406030204" pitchFamily="18" charset="0"/>
-                          </a:rPr>
-                        </m:ctrlPr>
-                      </m:dPr>
-                      <m:e>
-                        <m:r>
-                          <a:rPr lang="en-GB" b="0" i="1" smtClean="0">
-                            <a:latin typeface="Cambria Math" panose="02040503050406030204" pitchFamily="18" charset="0"/>
-                          </a:rPr>
-                          <m:t>𝐴</m:t>
-                        </m:r>
-                      </m:e>
-                    </m:d>
-                    <m:r>
-                      <a:rPr lang="en-GB" b="0" i="1" smtClean="0">
-                        <a:latin typeface="Cambria Math" panose="02040503050406030204" pitchFamily="18" charset="0"/>
-                      </a:rPr>
-                      <m:t>=[4,18]</m:t>
-                    </m:r>
-                  </m:oMath>
-                </a14:m>
-                <a:endParaRPr lang="en-GB" dirty="0"/>
-              </a:p>
-              <a:p>
-                <a:pPr marL="285750" indent="-285750">
-                  <a:buFont typeface="Arial" panose="020B0604020202020204" pitchFamily="34" charset="0"/>
-                  <a:buChar char="•"/>
-                </a:pPr>
-                <a:r>
-                  <a:rPr lang="en-GB" dirty="0"/>
-                  <a:t>Hidden Layers:</a:t>
+                  <a:rPr lang="en-GB" sz="2400" dirty="0"/>
+                  <a:t> Hidden Layers:</a:t>
                 </a:r>
               </a:p>
               <a:p>
@@ -6651,15 +7337,15 @@
                   <a:buAutoNum type="arabicPeriod"/>
                 </a:pPr>
                 <a:r>
-                  <a:rPr lang="en-GB" dirty="0"/>
+                  <a:rPr lang="en-GB" sz="2400" dirty="0"/>
                   <a:t>16 8x8 filters with stride 4 then </a:t>
                 </a:r>
                 <a:r>
-                  <a:rPr lang="en-GB" dirty="0" err="1"/>
+                  <a:rPr lang="en-GB" sz="2400" dirty="0" err="1"/>
                   <a:t>ReLU</a:t>
                 </a:r>
                 <a:r>
-                  <a:rPr lang="en-GB" dirty="0"/>
+                  <a:rPr lang="en-GB" sz="2400" dirty="0"/>
                   <a:t> activation</a:t>
                 </a:r>
               </a:p>
@@ -6669,15 +7355,15 @@
                   <a:buAutoNum type="arabicPeriod"/>
                 </a:pPr>
                 <a:r>
-                  <a:rPr lang="en-GB" dirty="0"/>
+                  <a:rPr lang="en-GB" sz="2400" dirty="0"/>
                   <a:t>32 4x4 filters with stride 2 the </a:t>
                 </a:r>
                 <a:r>
-                  <a:rPr lang="en-GB" dirty="0" err="1"/>
+                  <a:rPr lang="en-GB" sz="2400" dirty="0" err="1"/>
                   <a:t>ReLU</a:t>
                 </a:r>
                 <a:r>
-                  <a:rPr lang="en-GB" dirty="0"/>
+                  <a:rPr lang="en-GB" sz="2400" dirty="0"/>
                   <a:t> activation</a:t>
                 </a:r>
               </a:p>
@@ -6687,7 +7373,7 @@
                   <a:buAutoNum type="arabicPeriod"/>
                 </a:pPr>
                 <a:r>
-                  <a:rPr lang="en-GB" dirty="0"/>
+                  <a:rPr lang="en-GB" sz="2400" dirty="0"/>
                   <a:t>Fully connected layer with 256 rectifier units.</a:t>
                 </a:r>
               </a:p>
@@ -6697,9 +7383,39 @@
                   <a:buChar char="•"/>
                 </a:pPr>
                 <a:r>
-                  <a:rPr lang="en-GB" dirty="0"/>
-                  <a:t>Fully-Connected linear layer with output for each action.</a:t>
+                  <a:rPr lang="en-GB" sz="2400" dirty="0"/>
+                  <a:t>Fully-Connected linear layer outputs predicted Q-Values for each action </a:t>
                 </a:r>
+                <a14:m>
+                  <m:oMath xmlns:m="http://schemas.openxmlformats.org/officeDocument/2006/math">
+                    <m:d>
+                      <m:dPr>
+                        <m:begChr m:val="|"/>
+                        <m:endChr m:val="|"/>
+                        <m:ctrlPr>
+                          <a:rPr lang="en-GB" sz="2400" i="1">
+                            <a:latin typeface="Cambria Math" panose="02040503050406030204" pitchFamily="18" charset="0"/>
+                          </a:rPr>
+                        </m:ctrlPr>
+                      </m:dPr>
+                      <m:e>
+                        <m:r>
+                          <a:rPr lang="en-GB" sz="2400" i="1">
+                            <a:latin typeface="Cambria Math" panose="02040503050406030204" pitchFamily="18" charset="0"/>
+                          </a:rPr>
+                          <m:t>𝐴</m:t>
+                        </m:r>
+                      </m:e>
+                    </m:d>
+                    <m:r>
+                      <a:rPr lang="en-GB" sz="2400" i="1">
+                        <a:latin typeface="Cambria Math" panose="02040503050406030204" pitchFamily="18" charset="0"/>
+                      </a:rPr>
+                      <m:t>=[4,18]</m:t>
+                    </m:r>
+                  </m:oMath>
+                </a14:m>
+                <a:endParaRPr lang="en-GB" sz="2400" dirty="0"/>
               </a:p>
             </p:txBody>
           </p:sp>
@@ -6707,22 +7423,22 @@
         <mc:Fallback>
           <p:sp>
             <p:nvSpPr>
-              <p:cNvPr id="3" name="TextBox 2">
+              <p:cNvPr id="4" name="Rectangle 3">
                 <a:extLst>
                   <a:ext uri="{FF2B5EF4-FFF2-40B4-BE49-F238E27FC236}">
-                    <a16:creationId xmlns:a16="http://schemas.microsoft.com/office/drawing/2014/main" id="{9B80D7E1-ABEC-4FBC-84D6-327B354E9866}"/>
+                    <a16:creationId xmlns:a16="http://schemas.microsoft.com/office/drawing/2014/main" id="{6167CD22-3173-44BF-A8DF-31B78D9EDD93}"/>
                   </a:ext>
                 </a:extLst>
               </p:cNvPr>
-              <p:cNvSpPr txBox="1">
+              <p:cNvSpPr>
                 <a:spLocks noRot="1" noChangeAspect="1" noMove="1" noResize="1" noEditPoints="1" noAdjustHandles="1" noChangeArrowheads="1" noChangeShapeType="1" noTextEdit="1"/>
               </p:cNvSpPr>
               <p:nvPr/>
             </p:nvSpPr>
             <p:spPr>
               <a:xfrm>
-                <a:off x="1056067" y="1690688"/>
-                <a:ext cx="8229601" cy="3139321"/>
+                <a:off x="770021" y="4017986"/>
+                <a:ext cx="11181347" cy="2308324"/>
               </a:xfrm>
               <a:prstGeom prst="rect">
                 <a:avLst/>
@@ -6730,7 +7446,7 @@
               <a:blipFill>
                 <a:blip r:embed="rId4"/>
                 <a:stretch>
-                  <a:fillRect l="-444" t="-971" b="-2136"/>
+                  <a:fillRect l="-708" t="-2111" b="-5013"/>
                 </a:stretch>
               </a:blipFill>
             </p:spPr>
@@ -6905,7 +7621,7 @@
         </p:nvSpPr>
         <p:spPr>
           <a:xfrm>
-            <a:off x="2356834" y="4610637"/>
+            <a:off x="2258096" y="4501269"/>
             <a:ext cx="7675808" cy="369332"/>
           </a:xfrm>
           <a:prstGeom prst="rect">
@@ -6988,12 +7704,299 @@
           <a:lstStyle/>
           <a:p>
             <a:r>
-              <a:rPr lang="en-GB" dirty="0"/>
+              <a:rPr lang="en-GB" dirty="0">
+                <a:ln w="0"/>
+                <a:effectLst>
+                  <a:outerShdw blurRad="38100" dist="19050" dir="2700000" algn="tl" rotWithShape="0">
+                    <a:schemeClr val="dk1">
+                      <a:alpha val="40000"/>
+                    </a:schemeClr>
+                  </a:outerShdw>
+                </a:effectLst>
+              </a:rPr>
               <a:t>Experiments &amp; Results</a:t>
             </a:r>
           </a:p>
         </p:txBody>
       </p:sp>
+      <p:pic>
+        <p:nvPicPr>
+          <p:cNvPr id="4" name="Picture 3">
+            <a:extLst>
+              <a:ext uri="{FF2B5EF4-FFF2-40B4-BE49-F238E27FC236}">
+                <a16:creationId xmlns:a16="http://schemas.microsoft.com/office/drawing/2014/main" id="{D3E9761B-1E55-4F13-8D6C-474C1B8B94CE}"/>
+              </a:ext>
+            </a:extLst>
+          </p:cNvPr>
+          <p:cNvPicPr>
+            <a:picLocks noChangeAspect="1"/>
+          </p:cNvPicPr>
+          <p:nvPr/>
+        </p:nvPicPr>
+        <p:blipFill>
+          <a:blip r:embed="rId4">
+            <a:clrChange>
+              <a:clrFrom>
+                <a:srgbClr val="FFFFFF"/>
+              </a:clrFrom>
+              <a:clrTo>
+                <a:srgbClr val="FFFFFF">
+                  <a:alpha val="0"/>
+                </a:srgbClr>
+              </a:clrTo>
+            </a:clrChange>
+            <a:extLst>
+              <a:ext uri="{28A0092B-C50C-407E-A947-70E740481C1C}">
+                <a14:useLocalDpi xmlns:a14="http://schemas.microsoft.com/office/drawing/2010/main" val="0"/>
+              </a:ext>
+            </a:extLst>
+          </a:blip>
+          <a:stretch>
+            <a:fillRect/>
+          </a:stretch>
+        </p:blipFill>
+        <p:spPr>
+          <a:xfrm>
+            <a:off x="1394688" y="4087143"/>
+            <a:ext cx="9354555" cy="1853641"/>
+          </a:xfrm>
+          <a:prstGeom prst="rect">
+            <a:avLst/>
+          </a:prstGeom>
+        </p:spPr>
+      </p:pic>
+      <p:sp>
+        <p:nvSpPr>
+          <p:cNvPr id="5" name="TextBox 4">
+            <a:extLst>
+              <a:ext uri="{FF2B5EF4-FFF2-40B4-BE49-F238E27FC236}">
+                <a16:creationId xmlns:a16="http://schemas.microsoft.com/office/drawing/2014/main" id="{04794AE9-7B1F-4CB2-AF41-30D12854D8BC}"/>
+              </a:ext>
+            </a:extLst>
+          </p:cNvPr>
+          <p:cNvSpPr txBox="1"/>
+          <p:nvPr/>
+        </p:nvSpPr>
+        <p:spPr>
+          <a:xfrm>
+            <a:off x="2364205" y="5940784"/>
+            <a:ext cx="7170821" cy="369332"/>
+          </a:xfrm>
+          <a:prstGeom prst="rect">
+            <a:avLst/>
+          </a:prstGeom>
+          <a:noFill/>
+        </p:spPr>
+        <p:txBody>
+          <a:bodyPr wrap="square" rtlCol="0">
+            <a:spAutoFit/>
+          </a:bodyPr>
+          <a:lstStyle/>
+          <a:p>
+            <a:pPr algn="ctr"/>
+            <a:r>
+              <a:rPr lang="en-GB" b="1" dirty="0"/>
+              <a:t>Visualisation of Q-Value change throughout game of Seaquest.</a:t>
+            </a:r>
+          </a:p>
+        </p:txBody>
+      </p:sp>
+      <p:grpSp>
+        <p:nvGrpSpPr>
+          <p:cNvPr id="13" name="Group 12">
+            <a:extLst>
+              <a:ext uri="{FF2B5EF4-FFF2-40B4-BE49-F238E27FC236}">
+                <a16:creationId xmlns:a16="http://schemas.microsoft.com/office/drawing/2014/main" id="{6CB33568-3168-442A-A5DA-C751A3E1D132}"/>
+              </a:ext>
+            </a:extLst>
+          </p:cNvPr>
+          <p:cNvGrpSpPr/>
+          <p:nvPr/>
+        </p:nvGrpSpPr>
+        <p:grpSpPr>
+          <a:xfrm>
+            <a:off x="468690" y="1345277"/>
+            <a:ext cx="5352560" cy="2278652"/>
+            <a:chOff x="468690" y="1345277"/>
+            <a:chExt cx="5352560" cy="2278652"/>
+          </a:xfrm>
+        </p:grpSpPr>
+        <p:pic>
+          <p:nvPicPr>
+            <p:cNvPr id="7" name="Picture 6">
+              <a:extLst>
+                <a:ext uri="{FF2B5EF4-FFF2-40B4-BE49-F238E27FC236}">
+                  <a16:creationId xmlns:a16="http://schemas.microsoft.com/office/drawing/2014/main" id="{A144219E-4E55-42AF-94A3-A869061D9DA4}"/>
+                </a:ext>
+              </a:extLst>
+            </p:cNvPr>
+            <p:cNvPicPr>
+              <a:picLocks noChangeAspect="1"/>
+            </p:cNvPicPr>
+            <p:nvPr/>
+          </p:nvPicPr>
+          <p:blipFill>
+            <a:blip r:embed="rId5">
+              <a:extLst>
+                <a:ext uri="{28A0092B-C50C-407E-A947-70E740481C1C}">
+                  <a14:useLocalDpi xmlns:a14="http://schemas.microsoft.com/office/drawing/2010/main" val="0"/>
+                </a:ext>
+              </a:extLst>
+            </a:blip>
+            <a:stretch>
+              <a:fillRect/>
+            </a:stretch>
+          </p:blipFill>
+          <p:spPr>
+            <a:xfrm>
+              <a:off x="468690" y="1345277"/>
+              <a:ext cx="5352560" cy="2134575"/>
+            </a:xfrm>
+            <a:prstGeom prst="rect">
+              <a:avLst/>
+            </a:prstGeom>
+          </p:spPr>
+        </p:pic>
+        <p:sp>
+          <p:nvSpPr>
+            <p:cNvPr id="8" name="TextBox 7">
+              <a:extLst>
+                <a:ext uri="{FF2B5EF4-FFF2-40B4-BE49-F238E27FC236}">
+                  <a16:creationId xmlns:a16="http://schemas.microsoft.com/office/drawing/2014/main" id="{C3ED4FD8-28DD-485B-AB3D-106051257773}"/>
+                </a:ext>
+              </a:extLst>
+            </p:cNvPr>
+            <p:cNvSpPr txBox="1"/>
+            <p:nvPr/>
+          </p:nvSpPr>
+          <p:spPr>
+            <a:xfrm>
+              <a:off x="1116443" y="3254597"/>
+              <a:ext cx="4426562" cy="369332"/>
+            </a:xfrm>
+            <a:prstGeom prst="rect">
+              <a:avLst/>
+            </a:prstGeom>
+            <a:noFill/>
+          </p:spPr>
+          <p:txBody>
+            <a:bodyPr wrap="square" rtlCol="0">
+              <a:spAutoFit/>
+            </a:bodyPr>
+            <a:lstStyle/>
+            <a:p>
+              <a:pPr algn="ctr"/>
+              <a:r>
+                <a:rPr lang="en-GB" b="1" dirty="0"/>
+                <a:t>Reward improvement over training (Noisy). </a:t>
+              </a:r>
+            </a:p>
+          </p:txBody>
+        </p:sp>
+      </p:grpSp>
+      <p:grpSp>
+        <p:nvGrpSpPr>
+          <p:cNvPr id="12" name="Group 11">
+            <a:extLst>
+              <a:ext uri="{FF2B5EF4-FFF2-40B4-BE49-F238E27FC236}">
+                <a16:creationId xmlns:a16="http://schemas.microsoft.com/office/drawing/2014/main" id="{EE809805-1EA9-461E-84B8-62B0BE1F0A60}"/>
+              </a:ext>
+            </a:extLst>
+          </p:cNvPr>
+          <p:cNvGrpSpPr/>
+          <p:nvPr/>
+        </p:nvGrpSpPr>
+        <p:grpSpPr>
+          <a:xfrm>
+            <a:off x="6370752" y="1184856"/>
+            <a:ext cx="5198705" cy="2244144"/>
+            <a:chOff x="6370752" y="1184856"/>
+            <a:chExt cx="5198705" cy="2244144"/>
+          </a:xfrm>
+        </p:grpSpPr>
+        <p:pic>
+          <p:nvPicPr>
+            <p:cNvPr id="11" name="Picture 10">
+              <a:extLst>
+                <a:ext uri="{FF2B5EF4-FFF2-40B4-BE49-F238E27FC236}">
+                  <a16:creationId xmlns:a16="http://schemas.microsoft.com/office/drawing/2014/main" id="{CB2274E4-E057-4CCB-A79A-931D11C6FB2F}"/>
+                </a:ext>
+              </a:extLst>
+            </p:cNvPr>
+            <p:cNvPicPr>
+              <a:picLocks noChangeAspect="1"/>
+            </p:cNvPicPr>
+            <p:nvPr/>
+          </p:nvPicPr>
+          <p:blipFill>
+            <a:blip r:embed="rId6">
+              <a:clrChange>
+                <a:clrFrom>
+                  <a:srgbClr val="FFFFFF"/>
+                </a:clrFrom>
+                <a:clrTo>
+                  <a:srgbClr val="FFFFFF">
+                    <a:alpha val="0"/>
+                  </a:srgbClr>
+                </a:clrTo>
+              </a:clrChange>
+              <a:extLst>
+                <a:ext uri="{28A0092B-C50C-407E-A947-70E740481C1C}">
+                  <a14:useLocalDpi xmlns:a14="http://schemas.microsoft.com/office/drawing/2010/main" val="0"/>
+                </a:ext>
+              </a:extLst>
+            </a:blip>
+            <a:stretch>
+              <a:fillRect/>
+            </a:stretch>
+          </p:blipFill>
+          <p:spPr>
+            <a:xfrm>
+              <a:off x="6370752" y="1184856"/>
+              <a:ext cx="5198705" cy="2080747"/>
+            </a:xfrm>
+            <a:prstGeom prst="rect">
+              <a:avLst/>
+            </a:prstGeom>
+          </p:spPr>
+        </p:pic>
+        <p:sp>
+          <p:nvSpPr>
+            <p:cNvPr id="9" name="TextBox 8">
+              <a:extLst>
+                <a:ext uri="{FF2B5EF4-FFF2-40B4-BE49-F238E27FC236}">
+                  <a16:creationId xmlns:a16="http://schemas.microsoft.com/office/drawing/2014/main" id="{80377AAC-F736-4B74-B974-6CB79EB20063}"/>
+                </a:ext>
+              </a:extLst>
+            </p:cNvPr>
+            <p:cNvSpPr txBox="1"/>
+            <p:nvPr/>
+          </p:nvSpPr>
+          <p:spPr>
+            <a:xfrm>
+              <a:off x="7076532" y="3059668"/>
+              <a:ext cx="4203032" cy="369332"/>
+            </a:xfrm>
+            <a:prstGeom prst="rect">
+              <a:avLst/>
+            </a:prstGeom>
+            <a:noFill/>
+          </p:spPr>
+          <p:txBody>
+            <a:bodyPr wrap="square" rtlCol="0">
+              <a:spAutoFit/>
+            </a:bodyPr>
+            <a:lstStyle/>
+            <a:p>
+              <a:pPr algn="ctr"/>
+              <a:r>
+                <a:rPr lang="en-GB" b="1" dirty="0"/>
+                <a:t>Q-Value improvement over training. </a:t>
+              </a:r>
+            </a:p>
+          </p:txBody>
+        </p:sp>
+      </p:grpSp>
     </p:spTree>
     <p:custDataLst>
       <p:tags r:id="rId1"/>
@@ -7011,6 +8014,20 @@
 </file>
 
 <file path=ppt/tags/tag1.xml><?xml version="1.0" encoding="utf-8"?>
+<p:tagLst xmlns:a="http://schemas.openxmlformats.org/drawingml/2006/main" xmlns:r="http://schemas.openxmlformats.org/officeDocument/2006/relationships" xmlns:p="http://schemas.openxmlformats.org/presentationml/2006/main">
+  <p:tag name="POINTS" val="1"/>
+  <p:tag name="TIME" val="15"/>
+</p:tagLst>
+</file>
+
+<file path=ppt/tags/tag10.xml><?xml version="1.0" encoding="utf-8"?>
+<p:tagLst xmlns:a="http://schemas.openxmlformats.org/drawingml/2006/main" xmlns:r="http://schemas.openxmlformats.org/officeDocument/2006/relationships" xmlns:p="http://schemas.openxmlformats.org/presentationml/2006/main">
+  <p:tag name="POINTS" val="1"/>
+  <p:tag name="TIME" val="15"/>
+</p:tagLst>
+</file>
+
+<file path=ppt/tags/tag11.xml><?xml version="1.0" encoding="utf-8"?>
 <p:tagLst xmlns:a="http://schemas.openxmlformats.org/drawingml/2006/main" xmlns:r="http://schemas.openxmlformats.org/officeDocument/2006/relationships" xmlns:p="http://schemas.openxmlformats.org/presentationml/2006/main">
   <p:tag name="POINTS" val="1"/>
   <p:tag name="TIME" val="15"/>

</xml_diff>